<commit_message>
50 slide power point, aggiungere screen
</commit_message>
<xml_diff>
--- a/Vector asset studio.pptx
+++ b/Vector asset studio.pptx
@@ -5,10 +5,10 @@
     <p:sldMasterId id="2147483673" r:id="rId1"/>
   </p:sldMasterIdLst>
   <p:notesMasterIdLst>
-    <p:notesMasterId r:id="rId46"/>
+    <p:notesMasterId r:id="rId52"/>
   </p:notesMasterIdLst>
   <p:handoutMasterIdLst>
-    <p:handoutMasterId r:id="rId47"/>
+    <p:handoutMasterId r:id="rId53"/>
   </p:handoutMasterIdLst>
   <p:sldIdLst>
     <p:sldId id="257" r:id="rId2"/>
@@ -51,10 +51,16 @@
     <p:sldId id="302" r:id="rId39"/>
     <p:sldId id="303" r:id="rId40"/>
     <p:sldId id="304" r:id="rId41"/>
-    <p:sldId id="306" r:id="rId42"/>
-    <p:sldId id="307" r:id="rId43"/>
-    <p:sldId id="308" r:id="rId44"/>
-    <p:sldId id="300" r:id="rId45"/>
+    <p:sldId id="308" r:id="rId42"/>
+    <p:sldId id="309" r:id="rId43"/>
+    <p:sldId id="310" r:id="rId44"/>
+    <p:sldId id="311" r:id="rId45"/>
+    <p:sldId id="312" r:id="rId46"/>
+    <p:sldId id="313" r:id="rId47"/>
+    <p:sldId id="314" r:id="rId48"/>
+    <p:sldId id="315" r:id="rId49"/>
+    <p:sldId id="316" r:id="rId50"/>
+    <p:sldId id="300" r:id="rId51"/>
   </p:sldIdLst>
   <p:sldSz cx="12192000" cy="6858000"/>
   <p:notesSz cx="6858000" cy="9144000"/>
@@ -155,10 +161,10 @@
   </p:defaultTextStyle>
   <p:extLst>
     <p:ext uri="{EFAFB233-063F-42B5-8137-9DF3F51BA10A}">
-      <p15:sldGuideLst xmlns="" xmlns:p15="http://schemas.microsoft.com/office/powerpoint/2012/main"/>
+      <p15:sldGuideLst xmlns:p15="http://schemas.microsoft.com/office/powerpoint/2012/main" xmlns=""/>
     </p:ext>
     <p:ext uri="{2D200454-40CA-4A62-9FC3-DE9A4176ACB9}">
-      <p15:notesGuideLst xmlns="" xmlns:p15="http://schemas.microsoft.com/office/powerpoint/2012/main"/>
+      <p15:notesGuideLst xmlns:p15="http://schemas.microsoft.com/office/powerpoint/2012/main" xmlns=""/>
     </p:ext>
   </p:extLst>
 </p:presentation>
@@ -255,7 +261,7 @@
             <a:fld id="{227A3769-973A-471F-AE95-803ACD9DB45A}" type="datetime1">
               <a:rPr lang="it-IT" smtClean="0"/>
               <a:pPr rtl="0"/>
-              <a:t>07/06/2020</a:t>
+              <a:t>09/06/2020</a:t>
             </a:fld>
             <a:endParaRPr lang="en-US" dirty="0"/>
           </a:p>
@@ -333,7 +339,7 @@
     </p:spTree>
     <p:extLst>
       <p:ext uri="{BB962C8B-B14F-4D97-AF65-F5344CB8AC3E}">
-        <p14:creationId xmlns="" xmlns:p14="http://schemas.microsoft.com/office/powerpoint/2010/main" val="1938533960"/>
+        <p14:creationId xmlns:p14="http://schemas.microsoft.com/office/powerpoint/2010/main" xmlns="" val="1938533960"/>
       </p:ext>
     </p:extLst>
   </p:cSld>
@@ -427,7 +433,7 @@
             <a:fld id="{F8B562AB-E890-432E-8086-3C35B5B6BC74}" type="datetime1">
               <a:rPr lang="it-IT" smtClean="0"/>
               <a:pPr rtl="0"/>
-              <a:t>07/06/2020</a:t>
+              <a:t>09/06/2020</a:t>
             </a:fld>
             <a:endParaRPr lang="en-US"/>
           </a:p>
@@ -600,7 +606,7 @@
     </p:spTree>
     <p:extLst>
       <p:ext uri="{BB962C8B-B14F-4D97-AF65-F5344CB8AC3E}">
-        <p14:creationId xmlns="" xmlns:p14="http://schemas.microsoft.com/office/powerpoint/2010/main" val="3889581830"/>
+        <p14:creationId xmlns:p14="http://schemas.microsoft.com/office/powerpoint/2010/main" xmlns="" val="3889581830"/>
       </p:ext>
     </p:extLst>
   </p:cSld>
@@ -723,7 +729,7 @@
           <p:cNvPr id="5" name="Rettangolo 4">
             <a:extLst>
               <a:ext uri="{FF2B5EF4-FFF2-40B4-BE49-F238E27FC236}">
-                <a16:creationId xmlns="" xmlns:a16="http://schemas.microsoft.com/office/drawing/2014/main" id="{904DB13E-F722-4ED6-BB00-556651E95281}"/>
+                <a16:creationId xmlns:a16="http://schemas.microsoft.com/office/drawing/2014/main" xmlns="" id="{904DB13E-F722-4ED6-BB00-556651E95281}"/>
               </a:ext>
             </a:extLst>
           </p:cNvPr>
@@ -872,7 +878,7 @@
           <p:cNvPr id="7" name="Gruppo 6">
             <a:extLst>
               <a:ext uri="{FF2B5EF4-FFF2-40B4-BE49-F238E27FC236}">
-                <a16:creationId xmlns="" xmlns:a16="http://schemas.microsoft.com/office/drawing/2014/main" id="{E26428D7-C6F3-473D-A360-A3F5C3E8728C}"/>
+                <a16:creationId xmlns:a16="http://schemas.microsoft.com/office/drawing/2014/main" xmlns="" id="{E26428D7-C6F3-473D-A360-A3F5C3E8728C}"/>
               </a:ext>
             </a:extLst>
           </p:cNvPr>
@@ -1174,7 +1180,7 @@
             <a:fld id="{46B2AB89-642D-461B-88E3-BE7E49276E6D}" type="datetime1">
               <a:rPr lang="it-IT" smtClean="0"/>
               <a:pPr rtl="0"/>
-              <a:t>07/06/2020</a:t>
+              <a:t>09/06/2020</a:t>
             </a:fld>
             <a:endParaRPr lang="en-US" dirty="0"/>
           </a:p>
@@ -1260,7 +1266,7 @@
     </p:spTree>
     <p:extLst>
       <p:ext uri="{BB962C8B-B14F-4D97-AF65-F5344CB8AC3E}">
-        <p14:creationId xmlns="" xmlns:p14="http://schemas.microsoft.com/office/powerpoint/2010/main" val="4147770102"/>
+        <p14:creationId xmlns:p14="http://schemas.microsoft.com/office/powerpoint/2010/main" xmlns="" val="4147770102"/>
       </p:ext>
     </p:extLst>
   </p:cSld>
@@ -1382,7 +1388,7 @@
             <a:fld id="{FB6DF1C0-0F0C-4064-ABD6-C9C1782C86AE}" type="datetime1">
               <a:rPr lang="it-IT" smtClean="0"/>
               <a:pPr rtl="0"/>
-              <a:t>07/06/2020</a:t>
+              <a:t>09/06/2020</a:t>
             </a:fld>
             <a:endParaRPr lang="en-US"/>
           </a:p>
@@ -1436,7 +1442,7 @@
     </p:spTree>
     <p:extLst>
       <p:ext uri="{BB962C8B-B14F-4D97-AF65-F5344CB8AC3E}">
-        <p14:creationId xmlns="" xmlns:p14="http://schemas.microsoft.com/office/powerpoint/2010/main" val="4023329902"/>
+        <p14:creationId xmlns:p14="http://schemas.microsoft.com/office/powerpoint/2010/main" xmlns="" val="4023329902"/>
       </p:ext>
     </p:extLst>
   </p:cSld>
@@ -1568,7 +1574,7 @@
             <a:fld id="{CD3A0FBA-A5A6-4E7F-AECA-E819E1A4206B}" type="datetime1">
               <a:rPr lang="it-IT" smtClean="0"/>
               <a:pPr rtl="0"/>
-              <a:t>07/06/2020</a:t>
+              <a:t>09/06/2020</a:t>
             </a:fld>
             <a:endParaRPr lang="en-US"/>
           </a:p>
@@ -1622,7 +1628,7 @@
     </p:spTree>
     <p:extLst>
       <p:ext uri="{BB962C8B-B14F-4D97-AF65-F5344CB8AC3E}">
-        <p14:creationId xmlns="" xmlns:p14="http://schemas.microsoft.com/office/powerpoint/2010/main" val="1510073493"/>
+        <p14:creationId xmlns:p14="http://schemas.microsoft.com/office/powerpoint/2010/main" xmlns="" val="1510073493"/>
       </p:ext>
     </p:extLst>
   </p:cSld>
@@ -1744,7 +1750,7 @@
             <a:fld id="{85E0D28E-6F2F-4715-A424-3B01AC64AD4B}" type="datetime1">
               <a:rPr lang="it-IT" smtClean="0"/>
               <a:pPr rtl="0"/>
-              <a:t>07/06/2020</a:t>
+              <a:t>09/06/2020</a:t>
             </a:fld>
             <a:endParaRPr lang="en-US"/>
           </a:p>
@@ -1798,7 +1804,7 @@
     </p:spTree>
     <p:extLst>
       <p:ext uri="{BB962C8B-B14F-4D97-AF65-F5344CB8AC3E}">
-        <p14:creationId xmlns="" xmlns:p14="http://schemas.microsoft.com/office/powerpoint/2010/main" val="2153708790"/>
+        <p14:creationId xmlns:p14="http://schemas.microsoft.com/office/powerpoint/2010/main" xmlns="" val="2153708790"/>
       </p:ext>
     </p:extLst>
   </p:cSld>
@@ -1830,7 +1836,7 @@
           <p:cNvPr id="15" name="Rettangolo 14">
             <a:extLst>
               <a:ext uri="{FF2B5EF4-FFF2-40B4-BE49-F238E27FC236}">
-                <a16:creationId xmlns="" xmlns:a16="http://schemas.microsoft.com/office/drawing/2014/main" id="{0A4A1889-E37C-4EC3-9E41-9DAD221CF389}"/>
+                <a16:creationId xmlns:a16="http://schemas.microsoft.com/office/drawing/2014/main" xmlns="" id="{0A4A1889-E37C-4EC3-9E41-9DAD221CF389}"/>
               </a:ext>
             </a:extLst>
           </p:cNvPr>
@@ -2028,7 +2034,7 @@
           <p:cNvPr id="16" name="Gruppo 15">
             <a:extLst>
               <a:ext uri="{FF2B5EF4-FFF2-40B4-BE49-F238E27FC236}">
-                <a16:creationId xmlns="" xmlns:a16="http://schemas.microsoft.com/office/drawing/2014/main" id="{1683EB04-C23E-490C-A1A6-030CF79D23C8}"/>
+                <a16:creationId xmlns:a16="http://schemas.microsoft.com/office/drawing/2014/main" xmlns="" id="{1683EB04-C23E-490C-A1A6-030CF79D23C8}"/>
               </a:ext>
             </a:extLst>
           </p:cNvPr>
@@ -2048,7 +2054,7 @@
             <p:cNvPr id="17" name="Connettore diritto 16">
               <a:extLst>
                 <a:ext uri="{FF2B5EF4-FFF2-40B4-BE49-F238E27FC236}">
-                  <a16:creationId xmlns="" xmlns:a16="http://schemas.microsoft.com/office/drawing/2014/main" id="{F8A84C03-E1CA-4A4E-81D6-9BB0C335B7A0}"/>
+                  <a16:creationId xmlns:a16="http://schemas.microsoft.com/office/drawing/2014/main" xmlns="" id="{F8A84C03-E1CA-4A4E-81D6-9BB0C335B7A0}"/>
                 </a:ext>
               </a:extLst>
             </p:cNvPr>
@@ -2096,7 +2102,7 @@
             <p:cNvPr id="18" name="Connettore diritto 17">
               <a:extLst>
                 <a:ext uri="{FF2B5EF4-FFF2-40B4-BE49-F238E27FC236}">
-                  <a16:creationId xmlns="" xmlns:a16="http://schemas.microsoft.com/office/drawing/2014/main" id="{4A26FB5A-D5D1-4DAB-AC43-7F51A7F2D197}"/>
+                  <a16:creationId xmlns:a16="http://schemas.microsoft.com/office/drawing/2014/main" xmlns="" id="{4A26FB5A-D5D1-4DAB-AC43-7F51A7F2D197}"/>
                 </a:ext>
               </a:extLst>
             </p:cNvPr>
@@ -2144,7 +2150,7 @@
             <p:cNvPr id="19" name="Connettore diritto 18">
               <a:extLst>
                 <a:ext uri="{FF2B5EF4-FFF2-40B4-BE49-F238E27FC236}">
-                  <a16:creationId xmlns="" xmlns:a16="http://schemas.microsoft.com/office/drawing/2014/main" id="{49303F14-E560-4C02-94F4-B4695FE26813}"/>
+                  <a16:creationId xmlns:a16="http://schemas.microsoft.com/office/drawing/2014/main" xmlns="" id="{49303F14-E560-4C02-94F4-B4695FE26813}"/>
                 </a:ext>
               </a:extLst>
             </p:cNvPr>
@@ -2349,7 +2355,7 @@
             <a:fld id="{F953424F-4FD0-4DEA-A244-2F5A83926123}" type="datetime1">
               <a:rPr lang="it-IT" smtClean="0"/>
               <a:pPr rtl="0"/>
-              <a:t>07/06/2020</a:t>
+              <a:t>09/06/2020</a:t>
             </a:fld>
             <a:endParaRPr lang="en-US" dirty="0"/>
           </a:p>
@@ -2435,7 +2441,7 @@
     </p:spTree>
     <p:extLst>
       <p:ext uri="{BB962C8B-B14F-4D97-AF65-F5344CB8AC3E}">
-        <p14:creationId xmlns="" xmlns:p14="http://schemas.microsoft.com/office/powerpoint/2010/main" val="606071433"/>
+        <p14:creationId xmlns:p14="http://schemas.microsoft.com/office/powerpoint/2010/main" xmlns="" val="606071433"/>
       </p:ext>
     </p:extLst>
   </p:cSld>
@@ -2675,7 +2681,7 @@
             <a:fld id="{ED487A35-6EB2-4106-87BE-5998F37E93E7}" type="datetime1">
               <a:rPr lang="it-IT" smtClean="0"/>
               <a:pPr rtl="0"/>
-              <a:t>07/06/2020</a:t>
+              <a:t>09/06/2020</a:t>
             </a:fld>
             <a:endParaRPr lang="en-US"/>
           </a:p>
@@ -2729,7 +2735,7 @@
     </p:spTree>
     <p:extLst>
       <p:ext uri="{BB962C8B-B14F-4D97-AF65-F5344CB8AC3E}">
-        <p14:creationId xmlns="" xmlns:p14="http://schemas.microsoft.com/office/powerpoint/2010/main" val="2744672162"/>
+        <p14:creationId xmlns:p14="http://schemas.microsoft.com/office/powerpoint/2010/main" xmlns="" val="2744672162"/>
       </p:ext>
     </p:extLst>
   </p:cSld>
@@ -3118,7 +3124,7 @@
             <a:fld id="{6D0A2449-0E6F-4EC8-9AF5-127FFF9E4F17}" type="datetime1">
               <a:rPr lang="it-IT" smtClean="0"/>
               <a:pPr rtl="0"/>
-              <a:t>07/06/2020</a:t>
+              <a:t>09/06/2020</a:t>
             </a:fld>
             <a:endParaRPr lang="en-US"/>
           </a:p>
@@ -3172,7 +3178,7 @@
     </p:spTree>
     <p:extLst>
       <p:ext uri="{BB962C8B-B14F-4D97-AF65-F5344CB8AC3E}">
-        <p14:creationId xmlns="" xmlns:p14="http://schemas.microsoft.com/office/powerpoint/2010/main" val="2929960713"/>
+        <p14:creationId xmlns:p14="http://schemas.microsoft.com/office/powerpoint/2010/main" xmlns="" val="2929960713"/>
       </p:ext>
     </p:extLst>
   </p:cSld>
@@ -3242,7 +3248,7 @@
             <a:fld id="{43ECC08F-3232-4266-A826-505EFF618F02}" type="datetime1">
               <a:rPr lang="it-IT" smtClean="0"/>
               <a:pPr rtl="0"/>
-              <a:t>07/06/2020</a:t>
+              <a:t>09/06/2020</a:t>
             </a:fld>
             <a:endParaRPr lang="en-US"/>
           </a:p>
@@ -3296,7 +3302,7 @@
     </p:spTree>
     <p:extLst>
       <p:ext uri="{BB962C8B-B14F-4D97-AF65-F5344CB8AC3E}">
-        <p14:creationId xmlns="" xmlns:p14="http://schemas.microsoft.com/office/powerpoint/2010/main" val="2667413146"/>
+        <p14:creationId xmlns:p14="http://schemas.microsoft.com/office/powerpoint/2010/main" xmlns="" val="2667413146"/>
       </p:ext>
     </p:extLst>
   </p:cSld>
@@ -3342,7 +3348,7 @@
             <a:fld id="{6CC19903-FCE7-40DD-9ABE-472E27EE3DF9}" type="datetime1">
               <a:rPr lang="it-IT" smtClean="0"/>
               <a:pPr rtl="0"/>
-              <a:t>07/06/2020</a:t>
+              <a:t>09/06/2020</a:t>
             </a:fld>
             <a:endParaRPr lang="en-US"/>
           </a:p>
@@ -3396,7 +3402,7 @@
     </p:spTree>
     <p:extLst>
       <p:ext uri="{BB962C8B-B14F-4D97-AF65-F5344CB8AC3E}">
-        <p14:creationId xmlns="" xmlns:p14="http://schemas.microsoft.com/office/powerpoint/2010/main" val="907247122"/>
+        <p14:creationId xmlns:p14="http://schemas.microsoft.com/office/powerpoint/2010/main" xmlns="" val="907247122"/>
       </p:ext>
     </p:extLst>
   </p:cSld>
@@ -3428,7 +3434,7 @@
           <p:cNvPr id="10" name="Rettangolo 9">
             <a:extLst>
               <a:ext uri="{FF2B5EF4-FFF2-40B4-BE49-F238E27FC236}">
-                <a16:creationId xmlns="" xmlns:a16="http://schemas.microsoft.com/office/drawing/2014/main" id="{D5E1BBF9-8BEF-4353-BA68-30AAF9EBD8D8}"/>
+                <a16:creationId xmlns:a16="http://schemas.microsoft.com/office/drawing/2014/main" xmlns="" id="{D5E1BBF9-8BEF-4353-BA68-30AAF9EBD8D8}"/>
               </a:ext>
             </a:extLst>
           </p:cNvPr>
@@ -3475,7 +3481,7 @@
           <p:cNvPr id="13" name="Rettangolo 12">
             <a:extLst>
               <a:ext uri="{FF2B5EF4-FFF2-40B4-BE49-F238E27FC236}">
-                <a16:creationId xmlns="" xmlns:a16="http://schemas.microsoft.com/office/drawing/2014/main" id="{5B941C21-2A5D-4912-AB06-1BB0C0EB6AE1}"/>
+                <a16:creationId xmlns:a16="http://schemas.microsoft.com/office/drawing/2014/main" xmlns="" id="{5B941C21-2A5D-4912-AB06-1BB0C0EB6AE1}"/>
               </a:ext>
             </a:extLst>
           </p:cNvPr>
@@ -3765,7 +3771,7 @@
             <a:fld id="{24F848B3-DD0C-4C86-9703-1DC7B521FCF8}" type="datetime1">
               <a:rPr lang="it-IT" smtClean="0"/>
               <a:pPr rtl="0"/>
-              <a:t>07/06/2020</a:t>
+              <a:t>09/06/2020</a:t>
             </a:fld>
             <a:endParaRPr lang="en-US"/>
           </a:p>
@@ -3844,7 +3850,7 @@
     </p:spTree>
     <p:extLst>
       <p:ext uri="{BB962C8B-B14F-4D97-AF65-F5344CB8AC3E}">
-        <p14:creationId xmlns="" xmlns:p14="http://schemas.microsoft.com/office/powerpoint/2010/main" val="2488602163"/>
+        <p14:creationId xmlns:p14="http://schemas.microsoft.com/office/powerpoint/2010/main" xmlns="" val="2488602163"/>
       </p:ext>
     </p:extLst>
   </p:cSld>
@@ -3876,7 +3882,7 @@
           <p:cNvPr id="11" name="Rettangolo 10">
             <a:extLst>
               <a:ext uri="{FF2B5EF4-FFF2-40B4-BE49-F238E27FC236}">
-                <a16:creationId xmlns="" xmlns:a16="http://schemas.microsoft.com/office/drawing/2014/main" id="{E687CA98-D9C7-497F-A1DA-7D22F8753BCE}"/>
+                <a16:creationId xmlns:a16="http://schemas.microsoft.com/office/drawing/2014/main" xmlns="" id="{E687CA98-D9C7-497F-A1DA-7D22F8753BCE}"/>
               </a:ext>
             </a:extLst>
           </p:cNvPr>
@@ -4032,7 +4038,7 @@
             <a:fld id="{711CFEF3-F103-4E31-9572-24F0BC84FDFF}" type="datetime1">
               <a:rPr lang="it-IT" smtClean="0"/>
               <a:pPr rtl="0"/>
-              <a:t>07/06/2020</a:t>
+              <a:t>09/06/2020</a:t>
             </a:fld>
             <a:endParaRPr lang="en-US" dirty="0"/>
           </a:p>
@@ -4116,7 +4122,7 @@
           <p:cNvPr id="12" name="Rettangolo 11">
             <a:extLst>
               <a:ext uri="{FF2B5EF4-FFF2-40B4-BE49-F238E27FC236}">
-                <a16:creationId xmlns="" xmlns:a16="http://schemas.microsoft.com/office/drawing/2014/main" id="{F8B3D8CC-BB13-41A5-8F34-B8E84A4F9534}"/>
+                <a16:creationId xmlns:a16="http://schemas.microsoft.com/office/drawing/2014/main" xmlns="" id="{F8B3D8CC-BB13-41A5-8F34-B8E84A4F9534}"/>
               </a:ext>
             </a:extLst>
           </p:cNvPr>
@@ -4282,7 +4288,7 @@
     </p:spTree>
     <p:extLst>
       <p:ext uri="{BB962C8B-B14F-4D97-AF65-F5344CB8AC3E}">
-        <p14:creationId xmlns="" xmlns:p14="http://schemas.microsoft.com/office/powerpoint/2010/main" val="2678223080"/>
+        <p14:creationId xmlns:p14="http://schemas.microsoft.com/office/powerpoint/2010/main" xmlns="" val="2678223080"/>
       </p:ext>
     </p:extLst>
   </p:cSld>
@@ -4319,7 +4325,7 @@
           <p:cNvPr id="9" name="Rettangolo 8">
             <a:extLst>
               <a:ext uri="{FF2B5EF4-FFF2-40B4-BE49-F238E27FC236}">
-                <a16:creationId xmlns="" xmlns:a16="http://schemas.microsoft.com/office/drawing/2014/main" id="{1E94681D-2A4C-4A8D-B9B5-31D440D0328D}"/>
+                <a16:creationId xmlns:a16="http://schemas.microsoft.com/office/drawing/2014/main" xmlns="" id="{1E94681D-2A4C-4A8D-B9B5-31D440D0328D}"/>
               </a:ext>
             </a:extLst>
           </p:cNvPr>
@@ -4554,7 +4560,7 @@
             <a:fld id="{8A8228F9-9C50-4094-9999-09A1682E91E0}" type="datetime1">
               <a:rPr lang="it-IT" smtClean="0"/>
               <a:pPr rtl="0"/>
-              <a:t>07/06/2020</a:t>
+              <a:t>09/06/2020</a:t>
             </a:fld>
             <a:endParaRPr lang="en-US" dirty="0"/>
           </a:p>
@@ -4646,7 +4652,7 @@
     </p:spTree>
     <p:extLst>
       <p:ext uri="{BB962C8B-B14F-4D97-AF65-F5344CB8AC3E}">
-        <p14:creationId xmlns="" xmlns:p14="http://schemas.microsoft.com/office/powerpoint/2010/main" val="3811577630"/>
+        <p14:creationId xmlns:p14="http://schemas.microsoft.com/office/powerpoint/2010/main" xmlns="" val="3811577630"/>
       </p:ext>
     </p:extLst>
   </p:cSld>
@@ -5039,7 +5045,7 @@
           <p:cNvPr id="6" name="Immagine 5" descr="Primo piano di un logo&#10;&#10;Descrizione generata automaticamente">
             <a:extLst>
               <a:ext uri="{FF2B5EF4-FFF2-40B4-BE49-F238E27FC236}">
-                <a16:creationId xmlns="" xmlns:a16="http://schemas.microsoft.com/office/drawing/2014/main" id="{8045422F-7258-40AC-BD2E-2469AA448922}"/>
+                <a16:creationId xmlns:a16="http://schemas.microsoft.com/office/drawing/2014/main" xmlns="" id="{8045422F-7258-40AC-BD2E-2469AA448922}"/>
               </a:ext>
             </a:extLst>
           </p:cNvPr>
@@ -5052,7 +5058,7 @@
           <a:blip r:embed="rId2" cstate="print">
             <a:extLst>
               <a:ext uri="{28A0092B-C50C-407E-A947-70E740481C1C}">
-                <a14:useLocalDpi xmlns="" xmlns:a14="http://schemas.microsoft.com/office/drawing/2010/main" val="0"/>
+                <a14:useLocalDpi xmlns:a14="http://schemas.microsoft.com/office/drawing/2010/main" xmlns="" val="0"/>
               </a:ext>
             </a:extLst>
           </a:blip>
@@ -5074,10 +5080,10 @@
           <p:cNvPr id="82" name="Rettangolo 81">
             <a:extLst>
               <a:ext uri="{FF2B5EF4-FFF2-40B4-BE49-F238E27FC236}">
-                <a16:creationId xmlns="" xmlns:a16="http://schemas.microsoft.com/office/drawing/2014/main" id="{2644B391-9BFE-445C-A9EC-F544BB85FBC7}"/>
+                <a16:creationId xmlns:a16="http://schemas.microsoft.com/office/drawing/2014/main" xmlns="" id="{2644B391-9BFE-445C-A9EC-F544BB85FBC7}"/>
               </a:ext>
               <a:ext uri="{C183D7F6-B498-43B3-948B-1728B52AA6E4}">
-                <adec:decorative xmlns="" xmlns:adec="http://schemas.microsoft.com/office/drawing/2017/decorative" val="1"/>
+                <adec:decorative xmlns:adec="http://schemas.microsoft.com/office/drawing/2017/decorative" xmlns="" val="1"/>
               </a:ext>
             </a:extLst>
           </p:cNvPr>
@@ -5087,7 +5093,7 @@
           <p:nvPr>
             <p:extLst>
               <p:ext uri="{386F3935-93C4-4BCD-93E2-E3B085C9AB24}">
-                <p16:designElem xmlns="" xmlns:p16="http://schemas.microsoft.com/office/powerpoint/2015/main" val="1"/>
+                <p16:designElem xmlns:p16="http://schemas.microsoft.com/office/powerpoint/2015/main" xmlns="" val="1"/>
               </p:ext>
             </p:extLst>
           </p:nvPr>
@@ -5119,10 +5125,10 @@
           <p:cNvPr id="84" name="Rettangolo 83">
             <a:extLst>
               <a:ext uri="{FF2B5EF4-FFF2-40B4-BE49-F238E27FC236}">
-                <a16:creationId xmlns="" xmlns:a16="http://schemas.microsoft.com/office/drawing/2014/main" id="{80F26E69-87D9-4655-AE7B-280A87AA3CAD}"/>
+                <a16:creationId xmlns:a16="http://schemas.microsoft.com/office/drawing/2014/main" xmlns="" id="{80F26E69-87D9-4655-AE7B-280A87AA3CAD}"/>
               </a:ext>
               <a:ext uri="{C183D7F6-B498-43B3-948B-1728B52AA6E4}">
-                <adec:decorative xmlns="" xmlns:adec="http://schemas.microsoft.com/office/drawing/2017/decorative" val="1"/>
+                <adec:decorative xmlns:adec="http://schemas.microsoft.com/office/drawing/2017/decorative" xmlns="" val="1"/>
               </a:ext>
             </a:extLst>
           </p:cNvPr>
@@ -5132,7 +5138,7 @@
           <p:nvPr>
             <p:extLst>
               <p:ext uri="{386F3935-93C4-4BCD-93E2-E3B085C9AB24}">
-                <p16:designElem xmlns="" xmlns:p16="http://schemas.microsoft.com/office/powerpoint/2015/main" val="1"/>
+                <p16:designElem xmlns:p16="http://schemas.microsoft.com/office/powerpoint/2015/main" xmlns="" val="1"/>
               </p:ext>
             </p:extLst>
           </p:nvPr>
@@ -5163,7 +5169,7 @@
           <p:cNvPr id="2" name="Titolo 1">
             <a:extLst>
               <a:ext uri="{FF2B5EF4-FFF2-40B4-BE49-F238E27FC236}">
-                <a16:creationId xmlns="" xmlns:a16="http://schemas.microsoft.com/office/drawing/2014/main" id="{18C3B467-088C-4F3D-A9A7-105C4E1E20CD}"/>
+                <a16:creationId xmlns:a16="http://schemas.microsoft.com/office/drawing/2014/main" xmlns="" id="{18C3B467-088C-4F3D-A9A7-105C4E1E20CD}"/>
               </a:ext>
             </a:extLst>
           </p:cNvPr>
@@ -5220,7 +5226,7 @@
     </p:spTree>
     <p:extLst>
       <p:ext uri="{BB962C8B-B14F-4D97-AF65-F5344CB8AC3E}">
-        <p14:creationId xmlns="" xmlns:p14="http://schemas.microsoft.com/office/powerpoint/2010/main" val="2584280759"/>
+        <p14:creationId xmlns:p14="http://schemas.microsoft.com/office/powerpoint/2010/main" xmlns="" val="2584280759"/>
       </p:ext>
     </p:extLst>
   </p:cSld>
@@ -5252,7 +5258,7 @@
           <p:cNvPr id="2" name="Titolo 1">
             <a:extLst>
               <a:ext uri="{FF2B5EF4-FFF2-40B4-BE49-F238E27FC236}">
-                <a16:creationId xmlns="" xmlns:a16="http://schemas.microsoft.com/office/drawing/2014/main" id="{1649DCAD-FA38-436C-B106-A235F4692CCA}"/>
+                <a16:creationId xmlns:a16="http://schemas.microsoft.com/office/drawing/2014/main" xmlns="" id="{1649DCAD-FA38-436C-B106-A235F4692CCA}"/>
               </a:ext>
             </a:extLst>
           </p:cNvPr>
@@ -5280,7 +5286,7 @@
           <p:cNvPr id="3" name="Segnaposto contenuto 2">
             <a:extLst>
               <a:ext uri="{FF2B5EF4-FFF2-40B4-BE49-F238E27FC236}">
-                <a16:creationId xmlns="" xmlns:a16="http://schemas.microsoft.com/office/drawing/2014/main" id="{AE9CA38E-DEB8-4B3C-A7EF-B065EE73E1B7}"/>
+                <a16:creationId xmlns:a16="http://schemas.microsoft.com/office/drawing/2014/main" xmlns="" id="{AE9CA38E-DEB8-4B3C-A7EF-B065EE73E1B7}"/>
               </a:ext>
             </a:extLst>
           </p:cNvPr>
@@ -5401,7 +5407,7 @@
     </p:spTree>
     <p:extLst>
       <p:ext uri="{BB962C8B-B14F-4D97-AF65-F5344CB8AC3E}">
-        <p14:creationId xmlns="" xmlns:p14="http://schemas.microsoft.com/office/powerpoint/2010/main" val="1909592427"/>
+        <p14:creationId xmlns:p14="http://schemas.microsoft.com/office/powerpoint/2010/main" xmlns="" val="1909592427"/>
       </p:ext>
     </p:extLst>
   </p:cSld>
@@ -5433,7 +5439,7 @@
           <p:cNvPr id="2" name="Titolo 1">
             <a:extLst>
               <a:ext uri="{FF2B5EF4-FFF2-40B4-BE49-F238E27FC236}">
-                <a16:creationId xmlns="" xmlns:a16="http://schemas.microsoft.com/office/drawing/2014/main" id="{DB6E8F6D-14C5-4FD7-BE1E-94F2CEBBD047}"/>
+                <a16:creationId xmlns:a16="http://schemas.microsoft.com/office/drawing/2014/main" xmlns="" id="{DB6E8F6D-14C5-4FD7-BE1E-94F2CEBBD047}"/>
               </a:ext>
             </a:extLst>
           </p:cNvPr>
@@ -5461,7 +5467,7 @@
           <p:cNvPr id="3" name="Segnaposto contenuto 2">
             <a:extLst>
               <a:ext uri="{FF2B5EF4-FFF2-40B4-BE49-F238E27FC236}">
-                <a16:creationId xmlns="" xmlns:a16="http://schemas.microsoft.com/office/drawing/2014/main" id="{7197C251-8208-4015-BFF1-537AC8FD5152}"/>
+                <a16:creationId xmlns:a16="http://schemas.microsoft.com/office/drawing/2014/main" xmlns="" id="{7197C251-8208-4015-BFF1-537AC8FD5152}"/>
               </a:ext>
             </a:extLst>
           </p:cNvPr>
@@ -5562,7 +5568,7 @@
     </p:spTree>
     <p:extLst>
       <p:ext uri="{BB962C8B-B14F-4D97-AF65-F5344CB8AC3E}">
-        <p14:creationId xmlns="" xmlns:p14="http://schemas.microsoft.com/office/powerpoint/2010/main" val="2542699001"/>
+        <p14:creationId xmlns:p14="http://schemas.microsoft.com/office/powerpoint/2010/main" xmlns="" val="2542699001"/>
       </p:ext>
     </p:extLst>
   </p:cSld>
@@ -5664,31 +5670,6 @@
           </a:p>
         </p:txBody>
       </p:sp>
-      <p:sp>
-        <p:nvSpPr>
-          <p:cNvPr id="4" name="Segnaposto data 3"/>
-          <p:cNvSpPr>
-            <a:spLocks noGrp="1"/>
-          </p:cNvSpPr>
-          <p:nvPr>
-            <p:ph type="dt" sz="half" idx="10"/>
-          </p:nvPr>
-        </p:nvSpPr>
-        <p:spPr/>
-        <p:txBody>
-          <a:bodyPr/>
-          <a:lstStyle/>
-          <a:p>
-            <a:pPr rtl="0"/>
-            <a:fld id="{85E0D28E-6F2F-4715-A424-3B01AC64AD4B}" type="datetime1">
-              <a:rPr lang="it-IT" smtClean="0"/>
-              <a:pPr rtl="0"/>
-              <a:t>07/06/2020</a:t>
-            </a:fld>
-            <a:endParaRPr lang="en-US"/>
-          </a:p>
-        </p:txBody>
-      </p:sp>
     </p:spTree>
   </p:cSld>
   <p:clrMapOvr>
@@ -5719,7 +5700,7 @@
           <p:cNvPr id="2" name="Titolo 1">
             <a:extLst>
               <a:ext uri="{FF2B5EF4-FFF2-40B4-BE49-F238E27FC236}">
-                <a16:creationId xmlns="" xmlns:a16="http://schemas.microsoft.com/office/drawing/2014/main" id="{1447AD0D-D9DC-4BD5-B662-30885C940A73}"/>
+                <a16:creationId xmlns:a16="http://schemas.microsoft.com/office/drawing/2014/main" xmlns="" id="{1447AD0D-D9DC-4BD5-B662-30885C940A73}"/>
               </a:ext>
             </a:extLst>
           </p:cNvPr>
@@ -5749,7 +5730,7 @@
           <p:cNvPr id="3" name="Segnaposto contenuto 2">
             <a:extLst>
               <a:ext uri="{FF2B5EF4-FFF2-40B4-BE49-F238E27FC236}">
-                <a16:creationId xmlns="" xmlns:a16="http://schemas.microsoft.com/office/drawing/2014/main" id="{FD9C302A-E7AA-40AD-8F0F-C6D9EFCC88F5}"/>
+                <a16:creationId xmlns:a16="http://schemas.microsoft.com/office/drawing/2014/main" xmlns="" id="{FD9C302A-E7AA-40AD-8F0F-C6D9EFCC88F5}"/>
               </a:ext>
             </a:extLst>
           </p:cNvPr>
@@ -5778,41 +5759,10 @@
           </a:p>
         </p:txBody>
       </p:sp>
-      <p:sp>
-        <p:nvSpPr>
-          <p:cNvPr id="4" name="Segnaposto data 3">
-            <a:extLst>
-              <a:ext uri="{FF2B5EF4-FFF2-40B4-BE49-F238E27FC236}">
-                <a16:creationId xmlns="" xmlns:a16="http://schemas.microsoft.com/office/drawing/2014/main" id="{F8E17882-5E17-41CC-8F32-7C442B1A3160}"/>
-              </a:ext>
-            </a:extLst>
-          </p:cNvPr>
-          <p:cNvSpPr>
-            <a:spLocks noGrp="1"/>
-          </p:cNvSpPr>
-          <p:nvPr>
-            <p:ph type="dt" sz="half" idx="10"/>
-          </p:nvPr>
-        </p:nvSpPr>
-        <p:spPr/>
-        <p:txBody>
-          <a:bodyPr/>
-          <a:lstStyle/>
-          <a:p>
-            <a:pPr rtl="0"/>
-            <a:fld id="{85E0D28E-6F2F-4715-A424-3B01AC64AD4B}" type="datetime1">
-              <a:rPr lang="it-IT" smtClean="0"/>
-              <a:pPr rtl="0"/>
-              <a:t>07/06/2020</a:t>
-            </a:fld>
-            <a:endParaRPr lang="en-US"/>
-          </a:p>
-        </p:txBody>
-      </p:sp>
     </p:spTree>
     <p:extLst>
       <p:ext uri="{BB962C8B-B14F-4D97-AF65-F5344CB8AC3E}">
-        <p14:creationId xmlns="" xmlns:p14="http://schemas.microsoft.com/office/powerpoint/2010/main" val="2009069328"/>
+        <p14:creationId xmlns:p14="http://schemas.microsoft.com/office/powerpoint/2010/main" xmlns="" val="2009069328"/>
       </p:ext>
     </p:extLst>
   </p:cSld>
@@ -5844,7 +5794,7 @@
           <p:cNvPr id="2" name="Titolo 1">
             <a:extLst>
               <a:ext uri="{FF2B5EF4-FFF2-40B4-BE49-F238E27FC236}">
-                <a16:creationId xmlns="" xmlns:a16="http://schemas.microsoft.com/office/drawing/2014/main" id="{64A3D193-E597-4EF9-9B61-D8F702BBDA6B}"/>
+                <a16:creationId xmlns:a16="http://schemas.microsoft.com/office/drawing/2014/main" xmlns="" id="{64A3D193-E597-4EF9-9B61-D8F702BBDA6B}"/>
               </a:ext>
             </a:extLst>
           </p:cNvPr>
@@ -5874,7 +5824,7 @@
           <p:cNvPr id="3" name="Segnaposto contenuto 2">
             <a:extLst>
               <a:ext uri="{FF2B5EF4-FFF2-40B4-BE49-F238E27FC236}">
-                <a16:creationId xmlns="" xmlns:a16="http://schemas.microsoft.com/office/drawing/2014/main" id="{78D544C2-8FC2-4FAB-8544-0FAFF728A8E0}"/>
+                <a16:creationId xmlns:a16="http://schemas.microsoft.com/office/drawing/2014/main" xmlns="" id="{78D544C2-8FC2-4FAB-8544-0FAFF728A8E0}"/>
               </a:ext>
             </a:extLst>
           </p:cNvPr>
@@ -5906,7 +5856,7 @@
     </p:spTree>
     <p:extLst>
       <p:ext uri="{BB962C8B-B14F-4D97-AF65-F5344CB8AC3E}">
-        <p14:creationId xmlns="" xmlns:p14="http://schemas.microsoft.com/office/powerpoint/2010/main" val="3152011591"/>
+        <p14:creationId xmlns:p14="http://schemas.microsoft.com/office/powerpoint/2010/main" xmlns="" val="3152011591"/>
       </p:ext>
     </p:extLst>
   </p:cSld>
@@ -5990,31 +5940,6 @@
           </a:p>
           <a:p>
             <a:endParaRPr lang="it-IT"/>
-          </a:p>
-        </p:txBody>
-      </p:sp>
-      <p:sp>
-        <p:nvSpPr>
-          <p:cNvPr id="4" name="Segnaposto data 3"/>
-          <p:cNvSpPr>
-            <a:spLocks noGrp="1"/>
-          </p:cNvSpPr>
-          <p:nvPr>
-            <p:ph type="dt" sz="half" idx="10"/>
-          </p:nvPr>
-        </p:nvSpPr>
-        <p:spPr/>
-        <p:txBody>
-          <a:bodyPr/>
-          <a:lstStyle/>
-          <a:p>
-            <a:pPr rtl="0"/>
-            <a:fld id="{85E0D28E-6F2F-4715-A424-3B01AC64AD4B}" type="datetime1">
-              <a:rPr lang="it-IT" smtClean="0"/>
-              <a:pPr rtl="0"/>
-              <a:t>07/06/2020</a:t>
-            </a:fld>
-            <a:endParaRPr lang="en-US"/>
           </a:p>
         </p:txBody>
       </p:sp>
@@ -6638,7 +6563,7 @@
           <p:cNvPr id="4" name="Titolo 3">
             <a:extLst>
               <a:ext uri="{FF2B5EF4-FFF2-40B4-BE49-F238E27FC236}">
-                <a16:creationId xmlns="" xmlns:a16="http://schemas.microsoft.com/office/drawing/2014/main" id="{6042F595-4D4D-4185-86A7-CBC567109825}"/>
+                <a16:creationId xmlns:a16="http://schemas.microsoft.com/office/drawing/2014/main" xmlns="" id="{6042F595-4D4D-4185-86A7-CBC567109825}"/>
               </a:ext>
             </a:extLst>
           </p:cNvPr>
@@ -6680,7 +6605,7 @@
           <p:cNvPr id="7" name="Segnaposto contenuto 6">
             <a:extLst>
               <a:ext uri="{FF2B5EF4-FFF2-40B4-BE49-F238E27FC236}">
-                <a16:creationId xmlns="" xmlns:a16="http://schemas.microsoft.com/office/drawing/2014/main" id="{7869F837-450C-4E6A-A262-9F07239CD2B8}"/>
+                <a16:creationId xmlns:a16="http://schemas.microsoft.com/office/drawing/2014/main" xmlns="" id="{7869F837-450C-4E6A-A262-9F07239CD2B8}"/>
               </a:ext>
             </a:extLst>
           </p:cNvPr>
@@ -6829,7 +6754,7 @@
     </p:spTree>
     <p:extLst>
       <p:ext uri="{BB962C8B-B14F-4D97-AF65-F5344CB8AC3E}">
-        <p14:creationId xmlns="" xmlns:p14="http://schemas.microsoft.com/office/powerpoint/2010/main" val="183243182"/>
+        <p14:creationId xmlns:p14="http://schemas.microsoft.com/office/powerpoint/2010/main" xmlns="" val="183243182"/>
       </p:ext>
     </p:extLst>
   </p:cSld>
@@ -6904,14 +6829,7 @@
                 <a:latin typeface="Times New Roman" pitchFamily="18" charset="0"/>
                 <a:cs typeface="Times New Roman" pitchFamily="18" charset="0"/>
               </a:rPr>
-              <a:t>Prima </a:t>
-            </a:r>
-            <a:r>
-              <a:rPr lang="it-IT" sz="2600" smtClean="0">
-                <a:latin typeface="Times New Roman" pitchFamily="18" charset="0"/>
-                <a:cs typeface="Times New Roman" pitchFamily="18" charset="0"/>
-              </a:rPr>
-              <a:t>di usare Vector Asset Studio bisogna aggiungere una dichiarazione nel file </a:t>
+              <a:t>Prima di usare Vector Asset Studio bisogna aggiungere una dichiarazione nel file </a:t>
             </a:r>
             <a:r>
               <a:rPr lang="it-IT" sz="2400" smtClean="0">
@@ -7039,7 +6957,7 @@
           <p:cNvPr id="2" name="Titolo 1">
             <a:extLst>
               <a:ext uri="{FF2B5EF4-FFF2-40B4-BE49-F238E27FC236}">
-                <a16:creationId xmlns="" xmlns:a16="http://schemas.microsoft.com/office/drawing/2014/main" id="{9AE4C8B6-E0B8-485F-A4DA-8628A66B76D2}"/>
+                <a16:creationId xmlns:a16="http://schemas.microsoft.com/office/drawing/2014/main" xmlns="" id="{9AE4C8B6-E0B8-485F-A4DA-8628A66B76D2}"/>
               </a:ext>
             </a:extLst>
           </p:cNvPr>
@@ -7072,7 +6990,7 @@
           <p:cNvPr id="6" name="Segnaposto contenuto 5">
             <a:extLst>
               <a:ext uri="{FF2B5EF4-FFF2-40B4-BE49-F238E27FC236}">
-                <a16:creationId xmlns="" xmlns:a16="http://schemas.microsoft.com/office/drawing/2014/main" id="{4BDEEE29-91C2-4DC2-978E-B83B3D557396}"/>
+                <a16:creationId xmlns:a16="http://schemas.microsoft.com/office/drawing/2014/main" xmlns="" id="{4BDEEE29-91C2-4DC2-978E-B83B3D557396}"/>
               </a:ext>
             </a:extLst>
           </p:cNvPr>
@@ -7087,7 +7005,7 @@
           <a:blip r:embed="rId2" cstate="print">
             <a:extLst>
               <a:ext uri="{28A0092B-C50C-407E-A947-70E740481C1C}">
-                <a14:useLocalDpi xmlns="" xmlns:a14="http://schemas.microsoft.com/office/drawing/2010/main" val="0"/>
+                <a14:useLocalDpi xmlns:a14="http://schemas.microsoft.com/office/drawing/2010/main" xmlns="" val="0"/>
               </a:ext>
             </a:extLst>
           </a:blip>
@@ -7139,7 +7057,7 @@
           <p:cNvPr id="12" name="CasellaDiTesto 11">
             <a:extLst>
               <a:ext uri="{FF2B5EF4-FFF2-40B4-BE49-F238E27FC236}">
-                <a16:creationId xmlns="" xmlns:a16="http://schemas.microsoft.com/office/drawing/2014/main" id="{E837BDAC-7E9D-4633-A500-EAEDA6613B83}"/>
+                <a16:creationId xmlns:a16="http://schemas.microsoft.com/office/drawing/2014/main" xmlns="" id="{E837BDAC-7E9D-4633-A500-EAEDA6613B83}"/>
               </a:ext>
             </a:extLst>
           </p:cNvPr>
@@ -7217,7 +7135,7 @@
     </p:spTree>
     <p:extLst>
       <p:ext uri="{BB962C8B-B14F-4D97-AF65-F5344CB8AC3E}">
-        <p14:creationId xmlns="" xmlns:p14="http://schemas.microsoft.com/office/powerpoint/2010/main" val="2197971088"/>
+        <p14:creationId xmlns:p14="http://schemas.microsoft.com/office/powerpoint/2010/main" xmlns="" val="2197971088"/>
       </p:ext>
     </p:extLst>
   </p:cSld>
@@ -7249,7 +7167,7 @@
           <p:cNvPr id="6" name="Segnaposto contenuto 5">
             <a:extLst>
               <a:ext uri="{FF2B5EF4-FFF2-40B4-BE49-F238E27FC236}">
-                <a16:creationId xmlns="" xmlns:a16="http://schemas.microsoft.com/office/drawing/2014/main" id="{0F35DE8C-3ACD-459B-9345-5DB90C6EC9FD}"/>
+                <a16:creationId xmlns:a16="http://schemas.microsoft.com/office/drawing/2014/main" xmlns="" id="{0F35DE8C-3ACD-459B-9345-5DB90C6EC9FD}"/>
               </a:ext>
             </a:extLst>
           </p:cNvPr>
@@ -7264,7 +7182,7 @@
           <a:blip r:embed="rId2" cstate="print">
             <a:extLst>
               <a:ext uri="{28A0092B-C50C-407E-A947-70E740481C1C}">
-                <a14:useLocalDpi xmlns="" xmlns:a14="http://schemas.microsoft.com/office/drawing/2010/main" val="0"/>
+                <a14:useLocalDpi xmlns:a14="http://schemas.microsoft.com/office/drawing/2010/main" xmlns="" val="0"/>
               </a:ext>
             </a:extLst>
           </a:blip>
@@ -7283,7 +7201,7 @@
           <p:cNvPr id="7" name="CasellaDiTesto 6">
             <a:extLst>
               <a:ext uri="{FF2B5EF4-FFF2-40B4-BE49-F238E27FC236}">
-                <a16:creationId xmlns="" xmlns:a16="http://schemas.microsoft.com/office/drawing/2014/main" id="{EC7460D1-A244-474C-932D-C3A68EF124A9}"/>
+                <a16:creationId xmlns:a16="http://schemas.microsoft.com/office/drawing/2014/main" xmlns="" id="{EC7460D1-A244-474C-932D-C3A68EF124A9}"/>
               </a:ext>
             </a:extLst>
           </p:cNvPr>
@@ -7442,7 +7360,7 @@
     </p:spTree>
     <p:extLst>
       <p:ext uri="{BB962C8B-B14F-4D97-AF65-F5344CB8AC3E}">
-        <p14:creationId xmlns="" xmlns:p14="http://schemas.microsoft.com/office/powerpoint/2010/main" val="2387262453"/>
+        <p14:creationId xmlns:p14="http://schemas.microsoft.com/office/powerpoint/2010/main" xmlns="" val="2387262453"/>
       </p:ext>
     </p:extLst>
   </p:cSld>
@@ -7726,37 +7644,12 @@
           </a:p>
         </p:txBody>
       </p:sp>
-      <p:sp>
-        <p:nvSpPr>
-          <p:cNvPr id="4" name="Segnaposto data 3"/>
-          <p:cNvSpPr>
-            <a:spLocks noGrp="1"/>
-          </p:cNvSpPr>
-          <p:nvPr>
-            <p:ph type="dt" sz="half" idx="10"/>
-          </p:nvPr>
-        </p:nvSpPr>
-        <p:spPr/>
-        <p:txBody>
-          <a:bodyPr/>
-          <a:lstStyle/>
-          <a:p>
-            <a:pPr rtl="0"/>
-            <a:fld id="{85E0D28E-6F2F-4715-A424-3B01AC64AD4B}" type="datetime1">
-              <a:rPr lang="it-IT" smtClean="0"/>
-              <a:pPr rtl="0"/>
-              <a:t>07/06/2020</a:t>
-            </a:fld>
-            <a:endParaRPr lang="en-US"/>
-          </a:p>
-        </p:txBody>
-      </p:sp>
       <p:pic>
         <p:nvPicPr>
           <p:cNvPr id="5" name="Segnaposto contenuto 5">
             <a:extLst>
               <a:ext uri="{FF2B5EF4-FFF2-40B4-BE49-F238E27FC236}">
-                <a16:creationId xmlns="" xmlns:a16="http://schemas.microsoft.com/office/drawing/2014/main" id="{0F35DE8C-3ACD-459B-9345-5DB90C6EC9FD}"/>
+                <a16:creationId xmlns:a16="http://schemas.microsoft.com/office/drawing/2014/main" xmlns="" id="{0F35DE8C-3ACD-459B-9345-5DB90C6EC9FD}"/>
               </a:ext>
             </a:extLst>
           </p:cNvPr>
@@ -7769,7 +7662,7 @@
           <a:blip r:embed="rId2" cstate="print">
             <a:extLst>
               <a:ext uri="{28A0092B-C50C-407E-A947-70E740481C1C}">
-                <a14:useLocalDpi xmlns="" xmlns:a14="http://schemas.microsoft.com/office/drawing/2010/main" val="0"/>
+                <a14:useLocalDpi xmlns:a14="http://schemas.microsoft.com/office/drawing/2010/main" xmlns="" val="0"/>
               </a:ext>
             </a:extLst>
           </a:blip>
@@ -7874,58 +7767,19 @@
                 <a:latin typeface="Times New Roman" panose="02020603050405020304" pitchFamily="18" charset="0"/>
                 <a:cs typeface="Times New Roman" panose="02020603050405020304" pitchFamily="18" charset="0"/>
               </a:rPr>
-              <a:t>Apparirà la finestra per selezionare l’icona</a:t>
-            </a:r>
+              <a:t>Apparirà la finestra per selezionare l’icona. </a:t>
+            </a:r>
+          </a:p>
+          <a:p>
+            <a:pPr marL="0" lvl="0">
+              <a:buNone/>
+            </a:pPr>
             <a:r>
               <a:rPr lang="it-IT" sz="2400" smtClean="0">
                 <a:latin typeface="Times New Roman" panose="02020603050405020304" pitchFamily="18" charset="0"/>
                 <a:cs typeface="Times New Roman" panose="02020603050405020304" pitchFamily="18" charset="0"/>
               </a:rPr>
-              <a:t>. </a:t>
-            </a:r>
-            <a:endParaRPr lang="it-IT" sz="2400" smtClean="0">
-              <a:latin typeface="Times New Roman" panose="02020603050405020304" pitchFamily="18" charset="0"/>
-              <a:cs typeface="Times New Roman" panose="02020603050405020304" pitchFamily="18" charset="0"/>
-            </a:endParaRPr>
-          </a:p>
-          <a:p>
-            <a:pPr marL="0" lvl="0">
-              <a:buNone/>
-            </a:pPr>
-            <a:r>
-              <a:rPr lang="it-IT" sz="2400" smtClean="0">
-                <a:latin typeface="Times New Roman" panose="02020603050405020304" pitchFamily="18" charset="0"/>
-                <a:cs typeface="Times New Roman" panose="02020603050405020304" pitchFamily="18" charset="0"/>
-              </a:rPr>
-              <a:t>È possibile </a:t>
-            </a:r>
-            <a:r>
-              <a:rPr lang="it-IT" sz="2400" smtClean="0">
-                <a:latin typeface="Times New Roman" panose="02020603050405020304" pitchFamily="18" charset="0"/>
-                <a:cs typeface="Times New Roman" panose="02020603050405020304" pitchFamily="18" charset="0"/>
-              </a:rPr>
-              <a:t>selezionare le icone in base alle </a:t>
-            </a:r>
-            <a:r>
-              <a:rPr lang="it-IT" sz="2400" smtClean="0">
-                <a:latin typeface="Times New Roman" panose="02020603050405020304" pitchFamily="18" charset="0"/>
-                <a:cs typeface="Times New Roman" panose="02020603050405020304" pitchFamily="18" charset="0"/>
-              </a:rPr>
-              <a:t>categorie </a:t>
-            </a:r>
-            <a:r>
-              <a:rPr lang="it-IT" sz="2400" smtClean="0">
-                <a:latin typeface="Times New Roman" panose="02020603050405020304" pitchFamily="18" charset="0"/>
-                <a:cs typeface="Times New Roman" panose="02020603050405020304" pitchFamily="18" charset="0"/>
-              </a:rPr>
-              <a:t>nella </a:t>
-            </a:r>
-            <a:r>
-              <a:rPr lang="it-IT" sz="2400" smtClean="0">
-                <a:latin typeface="Times New Roman" panose="02020603050405020304" pitchFamily="18" charset="0"/>
-                <a:cs typeface="Times New Roman" panose="02020603050405020304" pitchFamily="18" charset="0"/>
-              </a:rPr>
-              <a:t>lista a sinistra. </a:t>
+              <a:t>È possibile selezionare le icone in base alle categorie nella lista a sinistra. </a:t>
             </a:r>
           </a:p>
           <a:p>
@@ -7943,7 +7797,7 @@
           <a:blip r:embed="rId2" cstate="print">
             <a:extLst>
               <a:ext uri="{28A0092B-C50C-407E-A947-70E740481C1C}">
-                <a14:useLocalDpi xmlns:ve="http://schemas.openxmlformats.org/markup-compatibility/2006" xmlns:m="http://schemas.openxmlformats.org/officeDocument/2006/math" xmlns:wp="http://schemas.openxmlformats.org/drawingml/2006/wordprocessingDrawing" xmlns:wne="http://schemas.microsoft.com/office/word/2006/wordml" xmlns:a14="http://schemas.microsoft.com/office/drawing/2010/main" xmlns:wps="http://schemas.microsoft.com/office/word/2010/wordprocessingShape" xmlns:wpi="http://schemas.microsoft.com/office/word/2010/wordprocessingInk" xmlns:wpg="http://schemas.microsoft.com/office/word/2010/wordprocessingGroup" xmlns:w16se="http://schemas.microsoft.com/office/word/2015/wordml/symex" xmlns:w16cid="http://schemas.microsoft.com/office/word/2016/wordml/cid" xmlns:w15="http://schemas.microsoft.com/office/word/2012/wordml" xmlns:w14="http://schemas.microsoft.com/office/word/2010/wordml" xmlns:w="http://schemas.openxmlformats.org/wordprocessingml/2006/main" xmlns:w10="urn:schemas-microsoft-com:office:word" xmlns:wp14="http://schemas.microsoft.com/office/word/2010/wordprocessingDrawing" xmlns:v="urn:schemas-microsoft-com:vml" xmlns:o="urn:schemas-microsoft-com:office:office" xmlns:am3d="http://schemas.microsoft.com/office/drawing/2017/model3d" xmlns:aink="http://schemas.microsoft.com/office/drawing/2016/ink" xmlns:mc="http://schemas.openxmlformats.org/markup-compatibility/2006" xmlns:cx8="http://schemas.microsoft.com/office/drawing/2016/5/14/chartex" xmlns:cx7="http://schemas.microsoft.com/office/drawing/2016/5/13/chartex" xmlns:cx6="http://schemas.microsoft.com/office/drawing/2016/5/12/chartex" xmlns:cx5="http://schemas.microsoft.com/office/drawing/2016/5/11/chartex" xmlns:cx4="http://schemas.microsoft.com/office/drawing/2016/5/10/chartex" xmlns:cx3="http://schemas.microsoft.com/office/drawing/2016/5/9/chartex" xmlns:cx2="http://schemas.microsoft.com/office/drawing/2015/10/21/chartex" xmlns:cx1="http://schemas.microsoft.com/office/drawing/2015/9/8/chartex" xmlns:cx="http://schemas.microsoft.com/office/drawing/2014/chartex" xmlns:wpc="http://schemas.microsoft.com/office/word/2010/wordprocessingCanvas" xmlns="" xmlns:pic="http://schemas.openxmlformats.org/drawingml/2006/picture" xmlns:lc="http://schemas.openxmlformats.org/drawingml/2006/lockedCanvas" val="0"/>
+                <a14:useLocalDpi xmlns:lc="http://schemas.openxmlformats.org/drawingml/2006/lockedCanvas" xmlns:pic="http://schemas.openxmlformats.org/drawingml/2006/picture" xmlns="" xmlns:wpc="http://schemas.microsoft.com/office/word/2010/wordprocessingCanvas" xmlns:cx="http://schemas.microsoft.com/office/drawing/2014/chartex" xmlns:cx1="http://schemas.microsoft.com/office/drawing/2015/9/8/chartex" xmlns:cx2="http://schemas.microsoft.com/office/drawing/2015/10/21/chartex" xmlns:cx3="http://schemas.microsoft.com/office/drawing/2016/5/9/chartex" xmlns:cx4="http://schemas.microsoft.com/office/drawing/2016/5/10/chartex" xmlns:cx5="http://schemas.microsoft.com/office/drawing/2016/5/11/chartex" xmlns:cx6="http://schemas.microsoft.com/office/drawing/2016/5/12/chartex" xmlns:cx7="http://schemas.microsoft.com/office/drawing/2016/5/13/chartex" xmlns:cx8="http://schemas.microsoft.com/office/drawing/2016/5/14/chartex" xmlns:mc="http://schemas.openxmlformats.org/markup-compatibility/2006" xmlns:aink="http://schemas.microsoft.com/office/drawing/2016/ink" xmlns:am3d="http://schemas.microsoft.com/office/drawing/2017/model3d" xmlns:o="urn:schemas-microsoft-com:office:office" xmlns:v="urn:schemas-microsoft-com:vml" xmlns:wp14="http://schemas.microsoft.com/office/word/2010/wordprocessingDrawing" xmlns:w10="urn:schemas-microsoft-com:office:word" xmlns:w="http://schemas.openxmlformats.org/wordprocessingml/2006/main" xmlns:w14="http://schemas.microsoft.com/office/word/2010/wordml" xmlns:w15="http://schemas.microsoft.com/office/word/2012/wordml" xmlns:w16cid="http://schemas.microsoft.com/office/word/2016/wordml/cid" xmlns:w16se="http://schemas.microsoft.com/office/word/2015/wordml/symex" xmlns:wpg="http://schemas.microsoft.com/office/word/2010/wordprocessingGroup" xmlns:wpi="http://schemas.microsoft.com/office/word/2010/wordprocessingInk" xmlns:wps="http://schemas.microsoft.com/office/word/2010/wordprocessingShape" xmlns:a14="http://schemas.microsoft.com/office/drawing/2010/main" xmlns:wne="http://schemas.microsoft.com/office/word/2006/wordml" xmlns:wp="http://schemas.openxmlformats.org/drawingml/2006/wordprocessingDrawing" xmlns:m="http://schemas.openxmlformats.org/officeDocument/2006/math" xmlns:ve="http://schemas.openxmlformats.org/markup-compatibility/2006" val="0"/>
               </a:ext>
             </a:extLst>
           </a:blip>
@@ -8130,31 +7984,6 @@
       </p:grpSpPr>
       <p:sp>
         <p:nvSpPr>
-          <p:cNvPr id="4" name="Segnaposto data 3"/>
-          <p:cNvSpPr>
-            <a:spLocks noGrp="1"/>
-          </p:cNvSpPr>
-          <p:nvPr>
-            <p:ph type="dt" sz="half" idx="10"/>
-          </p:nvPr>
-        </p:nvSpPr>
-        <p:spPr/>
-        <p:txBody>
-          <a:bodyPr/>
-          <a:lstStyle/>
-          <a:p>
-            <a:pPr rtl="0"/>
-            <a:fld id="{85E0D28E-6F2F-4715-A424-3B01AC64AD4B}" type="datetime1">
-              <a:rPr lang="it-IT" smtClean="0"/>
-              <a:pPr rtl="0"/>
-              <a:t>07/06/2020</a:t>
-            </a:fld>
-            <a:endParaRPr lang="en-US"/>
-          </a:p>
-        </p:txBody>
-      </p:sp>
-      <p:sp>
-        <p:nvSpPr>
           <p:cNvPr id="5" name="CasellaDiTesto 4"/>
           <p:cNvSpPr txBox="1"/>
           <p:nvPr/>
@@ -8316,7 +8145,7 @@
           <p:cNvPr id="7" name="Segnaposto contenuto 5">
             <a:extLst>
               <a:ext uri="{FF2B5EF4-FFF2-40B4-BE49-F238E27FC236}">
-                <a16:creationId xmlns="" xmlns:a16="http://schemas.microsoft.com/office/drawing/2014/main" id="{4897E952-8496-4CAA-AE2B-A29C31AC6738}"/>
+                <a16:creationId xmlns:a16="http://schemas.microsoft.com/office/drawing/2014/main" xmlns="" id="{4897E952-8496-4CAA-AE2B-A29C31AC6738}"/>
               </a:ext>
             </a:extLst>
           </p:cNvPr>
@@ -8331,7 +8160,7 @@
           <a:blip r:embed="rId2" cstate="print">
             <a:extLst>
               <a:ext uri="{28A0092B-C50C-407E-A947-70E740481C1C}">
-                <a14:useLocalDpi xmlns="" xmlns:a14="http://schemas.microsoft.com/office/drawing/2010/main" val="0"/>
+                <a14:useLocalDpi xmlns:a14="http://schemas.microsoft.com/office/drawing/2010/main" xmlns="" val="0"/>
               </a:ext>
             </a:extLst>
           </a:blip>
@@ -8403,47 +8232,8 @@
                 <a:latin typeface="Times New Roman" panose="02020603050405020304" pitchFamily="18" charset="0"/>
                 <a:cs typeface="Times New Roman" panose="02020603050405020304" pitchFamily="18" charset="0"/>
               </a:rPr>
-              <a:t>In entrambi i casi </a:t>
-            </a:r>
-            <a:r>
-              <a:rPr lang="it-IT" sz="2400" smtClean="0">
-                <a:latin typeface="Times New Roman" panose="02020603050405020304" pitchFamily="18" charset="0"/>
-                <a:cs typeface="Times New Roman" panose="02020603050405020304" pitchFamily="18" charset="0"/>
-              </a:rPr>
-              <a:t>si </a:t>
-            </a:r>
-            <a:r>
-              <a:rPr lang="it-IT" sz="2400" smtClean="0">
-                <a:latin typeface="Times New Roman" panose="02020603050405020304" pitchFamily="18" charset="0"/>
-                <a:cs typeface="Times New Roman" panose="02020603050405020304" pitchFamily="18" charset="0"/>
-              </a:rPr>
-              <a:t>vedrà </a:t>
-            </a:r>
-            <a:r>
-              <a:rPr lang="it-IT" sz="2400" smtClean="0">
-                <a:latin typeface="Times New Roman" panose="02020603050405020304" pitchFamily="18" charset="0"/>
-                <a:cs typeface="Times New Roman" panose="02020603050405020304" pitchFamily="18" charset="0"/>
-              </a:rPr>
-              <a:t>un’anteprima </a:t>
-            </a:r>
-            <a:r>
-              <a:rPr lang="it-IT" sz="2400" smtClean="0">
-                <a:latin typeface="Times New Roman" panose="02020603050405020304" pitchFamily="18" charset="0"/>
-                <a:cs typeface="Times New Roman" panose="02020603050405020304" pitchFamily="18" charset="0"/>
-              </a:rPr>
-              <a:t>dell’immagine </a:t>
-            </a:r>
-            <a:r>
-              <a:rPr lang="it-IT" sz="2400" smtClean="0">
-                <a:latin typeface="Times New Roman" panose="02020603050405020304" pitchFamily="18" charset="0"/>
-                <a:cs typeface="Times New Roman" panose="02020603050405020304" pitchFamily="18" charset="0"/>
-              </a:rPr>
-              <a:t>scelta.</a:t>
-            </a:r>
-            <a:endParaRPr lang="it-IT" sz="2400" smtClean="0">
-              <a:latin typeface="Times New Roman" panose="02020603050405020304" pitchFamily="18" charset="0"/>
-              <a:cs typeface="Times New Roman" panose="02020603050405020304" pitchFamily="18" charset="0"/>
-            </a:endParaRPr>
+              <a:t>In entrambi i casi si vedrà un’anteprima dell’immagine scelta.</a:t>
+            </a:r>
           </a:p>
           <a:p>
             <a:pPr>
@@ -8478,31 +8268,6 @@
               <a:latin typeface="Times New Roman" panose="02020603050405020304" pitchFamily="18" charset="0"/>
               <a:cs typeface="Times New Roman" panose="02020603050405020304" pitchFamily="18" charset="0"/>
             </a:endParaRPr>
-          </a:p>
-        </p:txBody>
-      </p:sp>
-      <p:sp>
-        <p:nvSpPr>
-          <p:cNvPr id="4" name="Segnaposto data 3"/>
-          <p:cNvSpPr>
-            <a:spLocks noGrp="1"/>
-          </p:cNvSpPr>
-          <p:nvPr>
-            <p:ph type="dt" sz="half" idx="10"/>
-          </p:nvPr>
-        </p:nvSpPr>
-        <p:spPr/>
-        <p:txBody>
-          <a:bodyPr/>
-          <a:lstStyle/>
-          <a:p>
-            <a:pPr rtl="0"/>
-            <a:fld id="{85E0D28E-6F2F-4715-A424-3B01AC64AD4B}" type="datetime1">
-              <a:rPr lang="it-IT" smtClean="0"/>
-              <a:pPr rtl="0"/>
-              <a:t>07/06/2020</a:t>
-            </a:fld>
-            <a:endParaRPr lang="en-US"/>
           </a:p>
         </p:txBody>
       </p:sp>
@@ -8511,7 +8276,7 @@
           <p:cNvPr id="5" name="Segnaposto contenuto 5">
             <a:extLst>
               <a:ext uri="{FF2B5EF4-FFF2-40B4-BE49-F238E27FC236}">
-                <a16:creationId xmlns="" xmlns:a16="http://schemas.microsoft.com/office/drawing/2014/main" id="{61510913-41E3-435E-A44C-417D65A7502B}"/>
+                <a16:creationId xmlns:a16="http://schemas.microsoft.com/office/drawing/2014/main" xmlns="" id="{61510913-41E3-435E-A44C-417D65A7502B}"/>
               </a:ext>
             </a:extLst>
           </p:cNvPr>
@@ -8524,7 +8289,7 @@
           <a:blip r:embed="rId2" cstate="print">
             <a:extLst>
               <a:ext uri="{28A0092B-C50C-407E-A947-70E740481C1C}">
-                <a14:useLocalDpi xmlns="" xmlns:a14="http://schemas.microsoft.com/office/drawing/2010/main" val="0"/>
+                <a14:useLocalDpi xmlns:a14="http://schemas.microsoft.com/office/drawing/2010/main" xmlns="" val="0"/>
               </a:ext>
             </a:extLst>
           </a:blip>
@@ -8669,31 +8434,6 @@
           </a:p>
           <a:p>
             <a:endParaRPr lang="it-IT"/>
-          </a:p>
-        </p:txBody>
-      </p:sp>
-      <p:sp>
-        <p:nvSpPr>
-          <p:cNvPr id="4" name="Segnaposto data 3"/>
-          <p:cNvSpPr>
-            <a:spLocks noGrp="1"/>
-          </p:cNvSpPr>
-          <p:nvPr>
-            <p:ph type="dt" sz="half" idx="10"/>
-          </p:nvPr>
-        </p:nvSpPr>
-        <p:spPr/>
-        <p:txBody>
-          <a:bodyPr/>
-          <a:lstStyle/>
-          <a:p>
-            <a:pPr rtl="0"/>
-            <a:fld id="{85E0D28E-6F2F-4715-A424-3B01AC64AD4B}" type="datetime1">
-              <a:rPr lang="it-IT" smtClean="0"/>
-              <a:pPr rtl="0"/>
-              <a:t>07/06/2020</a:t>
-            </a:fld>
-            <a:endParaRPr lang="en-US"/>
           </a:p>
         </p:txBody>
       </p:sp>
@@ -9181,31 +8921,6 @@
           </a:p>
         </p:txBody>
       </p:sp>
-      <p:sp>
-        <p:nvSpPr>
-          <p:cNvPr id="4" name="Segnaposto data 3"/>
-          <p:cNvSpPr>
-            <a:spLocks noGrp="1"/>
-          </p:cNvSpPr>
-          <p:nvPr>
-            <p:ph type="dt" sz="half" idx="10"/>
-          </p:nvPr>
-        </p:nvSpPr>
-        <p:spPr/>
-        <p:txBody>
-          <a:bodyPr/>
-          <a:lstStyle/>
-          <a:p>
-            <a:pPr rtl="0"/>
-            <a:fld id="{85E0D28E-6F2F-4715-A424-3B01AC64AD4B}" type="datetime1">
-              <a:rPr lang="it-IT" smtClean="0"/>
-              <a:pPr rtl="0"/>
-              <a:t>07/06/2020</a:t>
-            </a:fld>
-            <a:endParaRPr lang="en-US"/>
-          </a:p>
-        </p:txBody>
-      </p:sp>
     </p:spTree>
   </p:cSld>
   <p:clrMapOvr>
@@ -9288,59 +9003,20 @@
                 <a:latin typeface="Times New Roman" pitchFamily="18" charset="0"/>
                 <a:cs typeface="Times New Roman" pitchFamily="18" charset="0"/>
               </a:rPr>
-              <a:t> </a:t>
-            </a:r>
+              <a:t> //mettere qualche screen in questa slide e quella precedente</a:t>
+            </a:r>
+          </a:p>
+          <a:p>
+            <a:pPr>
+              <a:buNone/>
+            </a:pPr>
             <a:r>
               <a:rPr lang="it-IT" sz="2400" smtClean="0">
                 <a:latin typeface="Times New Roman" pitchFamily="18" charset="0"/>
                 <a:cs typeface="Times New Roman" pitchFamily="18" charset="0"/>
               </a:rPr>
-              <a:t>//mettere qualche screen in questa slide e quella precedente</a:t>
-            </a:r>
-          </a:p>
-          <a:p>
-            <a:pPr>
-              <a:buNone/>
-            </a:pPr>
-            <a:r>
-              <a:rPr lang="it-IT" sz="2400" smtClean="0">
-                <a:latin typeface="Times New Roman" pitchFamily="18" charset="0"/>
-                <a:cs typeface="Times New Roman" pitchFamily="18" charset="0"/>
-              </a:rPr>
-              <a:t> </a:t>
-            </a:r>
-            <a:r>
-              <a:rPr lang="it-IT" sz="2400" smtClean="0">
-                <a:latin typeface="Times New Roman" pitchFamily="18" charset="0"/>
-                <a:cs typeface="Times New Roman" pitchFamily="18" charset="0"/>
-              </a:rPr>
-              <a:t>// anche una per ogni punto o ogni due punti e fare più slide</a:t>
-            </a:r>
-          </a:p>
-        </p:txBody>
-      </p:sp>
-      <p:sp>
-        <p:nvSpPr>
-          <p:cNvPr id="4" name="Segnaposto data 3"/>
-          <p:cNvSpPr>
-            <a:spLocks noGrp="1"/>
-          </p:cNvSpPr>
-          <p:nvPr>
-            <p:ph type="dt" sz="half" idx="10"/>
-          </p:nvPr>
-        </p:nvSpPr>
-        <p:spPr/>
-        <p:txBody>
-          <a:bodyPr/>
-          <a:lstStyle/>
-          <a:p>
-            <a:pPr rtl="0"/>
-            <a:fld id="{85E0D28E-6F2F-4715-A424-3B01AC64AD4B}" type="datetime1">
-              <a:rPr lang="it-IT" smtClean="0"/>
-              <a:pPr rtl="0"/>
-              <a:t>07/06/2020</a:t>
-            </a:fld>
-            <a:endParaRPr lang="en-US"/>
+              <a:t> // anche una per ogni punto o ogni due punti e fare più slide</a:t>
+            </a:r>
           </a:p>
         </p:txBody>
       </p:sp>
@@ -9450,31 +9126,6 @@
           </a:p>
         </p:txBody>
       </p:sp>
-      <p:sp>
-        <p:nvSpPr>
-          <p:cNvPr id="4" name="Segnaposto data 3"/>
-          <p:cNvSpPr>
-            <a:spLocks noGrp="1"/>
-          </p:cNvSpPr>
-          <p:nvPr>
-            <p:ph type="dt" sz="half" idx="10"/>
-          </p:nvPr>
-        </p:nvSpPr>
-        <p:spPr/>
-        <p:txBody>
-          <a:bodyPr/>
-          <a:lstStyle/>
-          <a:p>
-            <a:pPr rtl="0"/>
-            <a:fld id="{85E0D28E-6F2F-4715-A424-3B01AC64AD4B}" type="datetime1">
-              <a:rPr lang="it-IT" smtClean="0"/>
-              <a:pPr rtl="0"/>
-              <a:t>07/06/2020</a:t>
-            </a:fld>
-            <a:endParaRPr lang="en-US"/>
-          </a:p>
-        </p:txBody>
-      </p:sp>
     </p:spTree>
   </p:cSld>
   <p:clrMapOvr>
@@ -9520,31 +9171,6 @@
               <a:t>Mostrare vector drawable su widget</a:t>
             </a:r>
             <a:endParaRPr lang="it-IT"/>
-          </a:p>
-        </p:txBody>
-      </p:sp>
-      <p:sp>
-        <p:nvSpPr>
-          <p:cNvPr id="4" name="Segnaposto data 3"/>
-          <p:cNvSpPr>
-            <a:spLocks noGrp="1"/>
-          </p:cNvSpPr>
-          <p:nvPr>
-            <p:ph type="dt" sz="half" idx="10"/>
-          </p:nvPr>
-        </p:nvSpPr>
-        <p:spPr/>
-        <p:txBody>
-          <a:bodyPr/>
-          <a:lstStyle/>
-          <a:p>
-            <a:pPr rtl="0"/>
-            <a:fld id="{85E0D28E-6F2F-4715-A424-3B01AC64AD4B}" type="datetime1">
-              <a:rPr lang="it-IT" smtClean="0"/>
-              <a:pPr rtl="0"/>
-              <a:t>07/06/2020</a:t>
-            </a:fld>
-            <a:endParaRPr lang="en-US"/>
           </a:p>
         </p:txBody>
       </p:sp>
@@ -10175,31 +9801,6 @@
           </a:p>
         </p:txBody>
       </p:sp>
-      <p:sp>
-        <p:nvSpPr>
-          <p:cNvPr id="4" name="Segnaposto data 3"/>
-          <p:cNvSpPr>
-            <a:spLocks noGrp="1"/>
-          </p:cNvSpPr>
-          <p:nvPr>
-            <p:ph type="dt" sz="half" idx="10"/>
-          </p:nvPr>
-        </p:nvSpPr>
-        <p:spPr/>
-        <p:txBody>
-          <a:bodyPr/>
-          <a:lstStyle/>
-          <a:p>
-            <a:pPr rtl="0"/>
-            <a:fld id="{85E0D28E-6F2F-4715-A424-3B01AC64AD4B}" type="datetime1">
-              <a:rPr lang="it-IT" smtClean="0"/>
-              <a:pPr rtl="0"/>
-              <a:t>07/06/2020</a:t>
-            </a:fld>
-            <a:endParaRPr lang="en-US"/>
-          </a:p>
-        </p:txBody>
-      </p:sp>
     </p:spTree>
   </p:cSld>
   <p:clrMapOvr>
@@ -10305,15 +9906,7 @@
             </a:br>
             <a:r>
               <a:rPr lang="en-US" sz="1900" smtClean="0"/>
-              <a:t>    android:src="@drawable/myimage</a:t>
-            </a:r>
-            <a:r>
-              <a:rPr lang="en-US" sz="1900" smtClean="0"/>
-              <a:t>" </a:t>
-            </a:r>
-            <a:r>
-              <a:rPr lang="en-US" sz="1900" smtClean="0"/>
-              <a:t>/&gt;</a:t>
+              <a:t>    android:src="@drawable/myimage" /&gt;</a:t>
             </a:r>
           </a:p>
           <a:p>
@@ -10337,36 +9930,16 @@
             </a:pPr>
             <a:r>
               <a:rPr lang="en-US" sz="1900" smtClean="0"/>
-              <a:t>Resources res = </a:t>
-            </a:r>
+              <a:t>Resources res = getResources();</a:t>
+            </a:r>
+          </a:p>
+          <a:p>
+            <a:pPr>
+              <a:buNone/>
+            </a:pPr>
             <a:r>
               <a:rPr lang="en-US" sz="1900" smtClean="0"/>
-              <a:t>getResources</a:t>
-            </a:r>
-            <a:r>
-              <a:rPr lang="en-US" sz="1900" smtClean="0"/>
-              <a:t>();</a:t>
-            </a:r>
-          </a:p>
-          <a:p>
-            <a:pPr>
-              <a:buNone/>
-            </a:pPr>
-            <a:r>
-              <a:rPr lang="en-US" sz="1900" smtClean="0"/>
-              <a:t>Drawable </a:t>
-            </a:r>
-            <a:r>
-              <a:rPr lang="en-US" sz="1900" smtClean="0"/>
-              <a:t>drawable = res.getDrawable(R.drawable.myimage, </a:t>
-            </a:r>
-            <a:r>
-              <a:rPr lang="en-US" sz="1900" smtClean="0"/>
-              <a:t>getTheme</a:t>
-            </a:r>
-            <a:r>
-              <a:rPr lang="en-US" sz="1900" smtClean="0"/>
-              <a:t>());</a:t>
+              <a:t>Drawable drawable = res.getDrawable(R.drawable.myimage, getTheme());</a:t>
             </a:r>
           </a:p>
           <a:p>
@@ -10386,31 +9959,6 @@
               <a:buNone/>
             </a:pPr>
             <a:endParaRPr lang="it-IT"/>
-          </a:p>
-        </p:txBody>
-      </p:sp>
-      <p:sp>
-        <p:nvSpPr>
-          <p:cNvPr id="4" name="Segnaposto data 3"/>
-          <p:cNvSpPr>
-            <a:spLocks noGrp="1"/>
-          </p:cNvSpPr>
-          <p:nvPr>
-            <p:ph type="dt" sz="half" idx="10"/>
-          </p:nvPr>
-        </p:nvSpPr>
-        <p:spPr/>
-        <p:txBody>
-          <a:bodyPr/>
-          <a:lstStyle/>
-          <a:p>
-            <a:pPr rtl="0"/>
-            <a:fld id="{85E0D28E-6F2F-4715-A424-3B01AC64AD4B}" type="datetime1">
-              <a:rPr lang="it-IT" smtClean="0"/>
-              <a:pPr rtl="0"/>
-              <a:t>07/06/2020</a:t>
-            </a:fld>
-            <a:endParaRPr lang="en-US"/>
           </a:p>
         </p:txBody>
       </p:sp>
@@ -10521,45 +10069,12 @@
             </a:br>
             <a:r>
               <a:rPr lang="en-US" sz="1800" smtClean="0"/>
-              <a:t>    app:srcCompat="@drawable/myimage</a:t>
-            </a:r>
-            <a:r>
-              <a:rPr lang="en-US" sz="1800" smtClean="0"/>
-              <a:t>" </a:t>
-            </a:r>
-            <a:r>
-              <a:rPr lang="en-US" sz="1800" smtClean="0"/>
-              <a:t>/&gt;</a:t>
+              <a:t>    app:srcCompat="@drawable/myimage" /&gt;</a:t>
             </a:r>
             <a:endParaRPr lang="it-IT" sz="1800" smtClean="0"/>
           </a:p>
           <a:p>
             <a:endParaRPr lang="it-IT" smtClean="0"/>
-          </a:p>
-        </p:txBody>
-      </p:sp>
-      <p:sp>
-        <p:nvSpPr>
-          <p:cNvPr id="4" name="Segnaposto data 3"/>
-          <p:cNvSpPr>
-            <a:spLocks noGrp="1"/>
-          </p:cNvSpPr>
-          <p:nvPr>
-            <p:ph type="dt" sz="half" idx="10"/>
-          </p:nvPr>
-        </p:nvSpPr>
-        <p:spPr/>
-        <p:txBody>
-          <a:bodyPr/>
-          <a:lstStyle/>
-          <a:p>
-            <a:pPr rtl="0"/>
-            <a:fld id="{85E0D28E-6F2F-4715-A424-3B01AC64AD4B}" type="datetime1">
-              <a:rPr lang="it-IT" smtClean="0"/>
-              <a:pPr rtl="0"/>
-              <a:t>07/06/2020</a:t>
-            </a:fld>
-            <a:endParaRPr lang="en-US"/>
           </a:p>
         </p:txBody>
       </p:sp>
@@ -10593,7 +10108,7 @@
           <p:cNvPr id="2" name="Titolo 1">
             <a:extLst>
               <a:ext uri="{FF2B5EF4-FFF2-40B4-BE49-F238E27FC236}">
-                <a16:creationId xmlns="" xmlns:a16="http://schemas.microsoft.com/office/drawing/2014/main" id="{3398F7C4-7514-4AE3-BC85-857C4736813B}"/>
+                <a16:creationId xmlns:a16="http://schemas.microsoft.com/office/drawing/2014/main" xmlns="" id="{3398F7C4-7514-4AE3-BC85-857C4736813B}"/>
               </a:ext>
             </a:extLst>
           </p:cNvPr>
@@ -10629,7 +10144,7 @@
           <p:cNvPr id="3" name="Segnaposto contenuto 2">
             <a:extLst>
               <a:ext uri="{FF2B5EF4-FFF2-40B4-BE49-F238E27FC236}">
-                <a16:creationId xmlns="" xmlns:a16="http://schemas.microsoft.com/office/drawing/2014/main" id="{9DBC0072-9DC3-4488-B012-6C28443F48FA}"/>
+                <a16:creationId xmlns:a16="http://schemas.microsoft.com/office/drawing/2014/main" xmlns="" id="{9DBC0072-9DC3-4488-B012-6C28443F48FA}"/>
               </a:ext>
             </a:extLst>
           </p:cNvPr>
@@ -10728,37 +10243,6 @@
           </a:p>
           <a:p>
             <a:endParaRPr lang="it-IT" dirty="0"/>
-          </a:p>
-        </p:txBody>
-      </p:sp>
-      <p:sp>
-        <p:nvSpPr>
-          <p:cNvPr id="4" name="Segnaposto data 3">
-            <a:extLst>
-              <a:ext uri="{FF2B5EF4-FFF2-40B4-BE49-F238E27FC236}">
-                <a16:creationId xmlns="" xmlns:a16="http://schemas.microsoft.com/office/drawing/2014/main" id="{52341729-1279-416E-B91D-C28FD193F910}"/>
-              </a:ext>
-            </a:extLst>
-          </p:cNvPr>
-          <p:cNvSpPr>
-            <a:spLocks noGrp="1"/>
-          </p:cNvSpPr>
-          <p:nvPr>
-            <p:ph type="dt" sz="half" idx="10"/>
-          </p:nvPr>
-        </p:nvSpPr>
-        <p:spPr/>
-        <p:txBody>
-          <a:bodyPr/>
-          <a:lstStyle/>
-          <a:p>
-            <a:pPr rtl="0"/>
-            <a:fld id="{85E0D28E-6F2F-4715-A424-3B01AC64AD4B}" type="datetime1">
-              <a:rPr lang="it-IT" smtClean="0"/>
-              <a:pPr rtl="0"/>
-              <a:t>07/06/2020</a:t>
-            </a:fld>
-            <a:endParaRPr lang="en-US"/>
           </a:p>
         </p:txBody>
       </p:sp>
@@ -10801,7 +10285,7 @@
     </p:spTree>
     <p:extLst>
       <p:ext uri="{BB962C8B-B14F-4D97-AF65-F5344CB8AC3E}">
-        <p14:creationId xmlns="" xmlns:p14="http://schemas.microsoft.com/office/powerpoint/2010/main" val="3065832474"/>
+        <p14:creationId xmlns:p14="http://schemas.microsoft.com/office/powerpoint/2010/main" xmlns="" val="3065832474"/>
       </p:ext>
     </p:extLst>
   </p:cSld>
@@ -10871,21 +10355,7 @@
                 <a:latin typeface="Times New Roman" pitchFamily="18" charset="0"/>
                 <a:cs typeface="Times New Roman" pitchFamily="18" charset="0"/>
               </a:rPr>
-              <a:t>Occasionalmente si può avere il bisogno di typecastare la risorsa drawable alla sua classe esatta, come quando serve usare caratteristiche specifiche della classe  VectorDrawable. Per farlo, bisogna usare il seguente codice </a:t>
-            </a:r>
-            <a:r>
-              <a:rPr lang="it-IT" sz="2400" smtClean="0">
-                <a:latin typeface="Times New Roman" pitchFamily="18" charset="0"/>
-                <a:cs typeface="Times New Roman" pitchFamily="18" charset="0"/>
-              </a:rPr>
-              <a:t>Java</a:t>
-            </a:r>
-            <a:r>
-              <a:rPr lang="it-IT" sz="2400" smtClean="0">
-                <a:latin typeface="Times New Roman" pitchFamily="18" charset="0"/>
-                <a:cs typeface="Times New Roman" pitchFamily="18" charset="0"/>
-              </a:rPr>
-              <a:t>:</a:t>
+              <a:t>Occasionalmente si può avere il bisogno di typecastare la risorsa drawable alla sua classe esatta, come quando serve usare caratteristiche specifiche della classe  VectorDrawable. Per farlo, bisogna usare il seguente codice Java:</a:t>
             </a:r>
           </a:p>
           <a:p>
@@ -10958,31 +10428,6 @@
           </a:p>
           <a:p>
             <a:endParaRPr lang="it-IT"/>
-          </a:p>
-        </p:txBody>
-      </p:sp>
-      <p:sp>
-        <p:nvSpPr>
-          <p:cNvPr id="4" name="Segnaposto data 3"/>
-          <p:cNvSpPr>
-            <a:spLocks noGrp="1"/>
-          </p:cNvSpPr>
-          <p:nvPr>
-            <p:ph type="dt" sz="half" idx="10"/>
-          </p:nvPr>
-        </p:nvSpPr>
-        <p:spPr/>
-        <p:txBody>
-          <a:bodyPr/>
-          <a:lstStyle/>
-          <a:p>
-            <a:pPr rtl="0"/>
-            <a:fld id="{85E0D28E-6F2F-4715-A424-3B01AC64AD4B}" type="datetime1">
-              <a:rPr lang="it-IT" smtClean="0"/>
-              <a:pPr rtl="0"/>
-              <a:t>07/06/2020</a:t>
-            </a:fld>
-            <a:endParaRPr lang="en-US"/>
           </a:p>
         </p:txBody>
       </p:sp>
@@ -11026,6 +10471,10 @@
           <a:bodyPr/>
           <a:lstStyle/>
           <a:p>
+            <a:r>
+              <a:rPr lang="it-IT" smtClean="0"/>
+              <a:t>Modificare codice XML generato</a:t>
+            </a:r>
             <a:endParaRPr lang="it-IT"/>
           </a:p>
         </p:txBody>
@@ -11042,35 +10491,74 @@
         </p:nvSpPr>
         <p:spPr/>
         <p:txBody>
-          <a:bodyPr/>
-          <a:lstStyle/>
+          <a:bodyPr>
+            <a:normAutofit lnSpcReduction="10000"/>
+          </a:bodyPr>
+          <a:lstStyle/>
+          <a:p>
+            <a:pPr>
+              <a:buNone/>
+            </a:pPr>
+            <a:r>
+              <a:rPr lang="it-IT" sz="2400" smtClean="0">
+                <a:latin typeface="Times New Roman" pitchFamily="18" charset="0"/>
+                <a:cs typeface="Times New Roman" pitchFamily="18" charset="0"/>
+              </a:rPr>
+              <a:t>È possibile modificare il codice XML del vector drawable, ma non i file PNG e i corrispondenti codici XML generati a tempo di costruzione. In ogni caso, non è una pratica raccomandata.</a:t>
+            </a:r>
+          </a:p>
+          <a:p>
+            <a:pPr>
+              <a:buNone/>
+            </a:pPr>
+            <a:r>
+              <a:rPr lang="it-IT" sz="2400" smtClean="0">
+                <a:latin typeface="Times New Roman" pitchFamily="18" charset="0"/>
+                <a:cs typeface="Times New Roman" pitchFamily="18" charset="0"/>
+              </a:rPr>
+              <a:t>Quando si usa la tecnica di generazione PNG, VAS si assicura che il vector drawable corrisponda al PNG, e che il manifest contenga il codice corretto. Se si aggiunge codice che non è supportato su Android 4.4 (API level 20) o precedenti, il vettore e le immagini PNG potrebbero essere differenti.</a:t>
+            </a:r>
+            <a:endParaRPr lang="it-IT" sz="2400" b="1" smtClean="0">
+              <a:latin typeface="Times New Roman" pitchFamily="18" charset="0"/>
+              <a:cs typeface="Times New Roman" pitchFamily="18" charset="0"/>
+            </a:endParaRPr>
+          </a:p>
+          <a:p>
+            <a:pPr>
+              <a:buNone/>
+            </a:pPr>
+            <a:r>
+              <a:rPr lang="it-IT" sz="2400" smtClean="0">
+                <a:latin typeface="Times New Roman" pitchFamily="18" charset="0"/>
+                <a:cs typeface="Times New Roman" pitchFamily="18" charset="0"/>
+              </a:rPr>
+              <a:t>Inoltre bisogna assicurarsi che il manifest contenga codice che supporti i cambiamenti.</a:t>
+            </a:r>
+            <a:endParaRPr lang="it-IT" sz="2400" b="1" smtClean="0">
+              <a:latin typeface="Times New Roman" pitchFamily="18" charset="0"/>
+              <a:cs typeface="Times New Roman" pitchFamily="18" charset="0"/>
+            </a:endParaRPr>
+          </a:p>
+          <a:p>
+            <a:pPr>
+              <a:buNone/>
+            </a:pPr>
+            <a:endParaRPr lang="it-IT" sz="2400" smtClean="0">
+              <a:latin typeface="Times New Roman" pitchFamily="18" charset="0"/>
+              <a:cs typeface="Times New Roman" pitchFamily="18" charset="0"/>
+            </a:endParaRPr>
+          </a:p>
+          <a:p>
+            <a:pPr>
+              <a:buNone/>
+            </a:pPr>
+            <a:endParaRPr lang="it-IT" sz="2400" smtClean="0">
+              <a:latin typeface="Times New Roman" pitchFamily="18" charset="0"/>
+              <a:cs typeface="Times New Roman" pitchFamily="18" charset="0"/>
+            </a:endParaRPr>
+          </a:p>
           <a:p>
             <a:endParaRPr lang="it-IT"/>
-          </a:p>
-        </p:txBody>
-      </p:sp>
-      <p:sp>
-        <p:nvSpPr>
-          <p:cNvPr id="4" name="Segnaposto data 3"/>
-          <p:cNvSpPr>
-            <a:spLocks noGrp="1"/>
-          </p:cNvSpPr>
-          <p:nvPr>
-            <p:ph type="dt" sz="half" idx="10"/>
-          </p:nvPr>
-        </p:nvSpPr>
-        <p:spPr/>
-        <p:txBody>
-          <a:bodyPr/>
-          <a:lstStyle/>
-          <a:p>
-            <a:pPr rtl="0"/>
-            <a:fld id="{85E0D28E-6F2F-4715-A424-3B01AC64AD4B}" type="datetime1">
-              <a:rPr lang="it-IT" smtClean="0"/>
-              <a:pPr rtl="0"/>
-              <a:t>07/06/2020</a:t>
-            </a:fld>
-            <a:endParaRPr lang="en-US"/>
           </a:p>
         </p:txBody>
       </p:sp>
@@ -11114,6 +10602,10 @@
           <a:bodyPr/>
           <a:lstStyle/>
           <a:p>
+            <a:r>
+              <a:rPr lang="it-IT" smtClean="0"/>
+              <a:t>Modificare codice XML generato</a:t>
+            </a:r>
             <a:endParaRPr lang="it-IT"/>
           </a:p>
         </p:txBody>
@@ -11130,38 +10622,67 @@
         </p:nvSpPr>
         <p:spPr/>
         <p:txBody>
-          <a:bodyPr/>
-          <a:lstStyle/>
-          <a:p>
-            <a:endParaRPr lang="it-IT"/>
-          </a:p>
-        </p:txBody>
-      </p:sp>
-      <p:sp>
-        <p:nvSpPr>
-          <p:cNvPr id="4" name="Segnaposto data 3"/>
-          <p:cNvSpPr>
-            <a:spLocks noGrp="1"/>
-          </p:cNvSpPr>
-          <p:nvPr>
-            <p:ph type="dt" sz="half" idx="10"/>
-          </p:nvPr>
-        </p:nvSpPr>
-        <p:spPr/>
-        <p:txBody>
-          <a:bodyPr/>
-          <a:lstStyle/>
-          <a:p>
-            <a:pPr rtl="0"/>
-            <a:fld id="{85E0D28E-6F2F-4715-A424-3B01AC64AD4B}" type="datetime1">
-              <a:rPr lang="it-IT" smtClean="0"/>
-              <a:pPr rtl="0"/>
-              <a:t>07/06/2020</a:t>
-            </a:fld>
-            <a:endParaRPr lang="en-US"/>
-          </a:p>
-        </p:txBody>
-      </p:sp>
+          <a:bodyPr>
+            <a:normAutofit/>
+          </a:bodyPr>
+          <a:lstStyle/>
+          <a:p>
+            <a:pPr>
+              <a:buNone/>
+            </a:pPr>
+            <a:r>
+              <a:rPr lang="it-IT" sz="2400" smtClean="0">
+                <a:latin typeface="Times New Roman" pitchFamily="18" charset="0"/>
+                <a:cs typeface="Times New Roman" pitchFamily="18" charset="0"/>
+              </a:rPr>
+              <a:t>Per modificare il file XML quando non si usa la libreria di supporto:</a:t>
+            </a:r>
+          </a:p>
+          <a:p>
+            <a:r>
+              <a:rPr lang="it-IT" sz="2400" smtClean="0">
+                <a:latin typeface="Times New Roman" pitchFamily="18" charset="0"/>
+                <a:cs typeface="Times New Roman" pitchFamily="18" charset="0"/>
+              </a:rPr>
+              <a:t>Nella project window, fare doppio click sul file XML generato nel folder drawable.</a:t>
+            </a:r>
+            <a:endParaRPr lang="it-IT" sz="2400">
+              <a:latin typeface="Times New Roman" pitchFamily="18" charset="0"/>
+              <a:cs typeface="Times New Roman" pitchFamily="18" charset="0"/>
+            </a:endParaRPr>
+          </a:p>
+        </p:txBody>
+      </p:sp>
+      <p:pic>
+        <p:nvPicPr>
+          <p:cNvPr id="5" name="Immagine 4" descr="https://developer.android.com/images/tools/vas-codepreview_2-2_2x.png"/>
+          <p:cNvPicPr/>
+          <p:nvPr/>
+        </p:nvPicPr>
+        <p:blipFill>
+          <a:blip r:embed="rId2" cstate="print"/>
+          <a:srcRect/>
+          <a:stretch>
+            <a:fillRect/>
+          </a:stretch>
+        </p:blipFill>
+        <p:spPr bwMode="auto">
+          <a:xfrm>
+            <a:off x="3298372" y="3608614"/>
+            <a:ext cx="5306786" cy="2514600"/>
+          </a:xfrm>
+          <a:prstGeom prst="rect">
+            <a:avLst/>
+          </a:prstGeom>
+          <a:noFill/>
+          <a:ln w="9525">
+            <a:noFill/>
+            <a:miter lim="800000"/>
+            <a:headEnd/>
+            <a:tailEnd/>
+          </a:ln>
+        </p:spPr>
+      </p:pic>
     </p:spTree>
   </p:cSld>
   <p:clrMapOvr>
@@ -11212,7 +10733,7 @@
       </p:sp>
       <p:sp>
         <p:nvSpPr>
-          <p:cNvPr id="3" name="Segnaposto contenuto 2"/>
+          <p:cNvPr id="6" name="Segnaposto contenuto 5"/>
           <p:cNvSpPr>
             <a:spLocks noGrp="1"/>
           </p:cNvSpPr>
@@ -11226,35 +10747,83 @@
           <a:lstStyle/>
           <a:p>
             <a:r>
-              <a:rPr lang="it-IT" smtClean="0"/>
-              <a:t>Qua escono un boston de slide ma adesso piscio</a:t>
-            </a:r>
+              <a:rPr lang="it-IT" sz="2400" smtClean="0">
+                <a:latin typeface="Times New Roman" pitchFamily="18" charset="0"/>
+                <a:cs typeface="Times New Roman" pitchFamily="18" charset="0"/>
+              </a:rPr>
+              <a:t>Modificare il codice XML basandosi su cosa è supportato dal livello minimo di API:</a:t>
+            </a:r>
+          </a:p>
+          <a:p>
+            <a:pPr lvl="1">
+              <a:buFont typeface="Wingdings" pitchFamily="2" charset="2"/>
+              <a:buChar char="§"/>
+            </a:pPr>
+            <a:r>
+              <a:rPr lang="it-IT" sz="2400" smtClean="0">
+                <a:latin typeface="Times New Roman" pitchFamily="18" charset="0"/>
+                <a:cs typeface="Times New Roman" pitchFamily="18" charset="0"/>
+              </a:rPr>
+              <a:t>Per Android 5.0 (API level 21) e superiori</a:t>
+            </a:r>
+            <a:r>
+              <a:rPr lang="it-IT" sz="2400" smtClean="0">
+                <a:latin typeface="Times New Roman" pitchFamily="18" charset="0"/>
+                <a:cs typeface="Times New Roman" pitchFamily="18" charset="0"/>
+              </a:rPr>
+              <a:t>, </a:t>
+            </a:r>
+            <a:r>
+              <a:rPr lang="it-IT" sz="2400" smtClean="0">
+                <a:latin typeface="Times New Roman" pitchFamily="18" charset="0"/>
+                <a:cs typeface="Times New Roman" pitchFamily="18" charset="0"/>
+              </a:rPr>
+              <a:t>Vector Asset Studio supporta </a:t>
+            </a:r>
+            <a:r>
+              <a:rPr lang="it-IT" sz="2400" smtClean="0">
+                <a:latin typeface="Times New Roman" pitchFamily="18" charset="0"/>
+                <a:cs typeface="Times New Roman" pitchFamily="18" charset="0"/>
+              </a:rPr>
+              <a:t>tutti gli elementi Drawable e VectorDrawable. È possibile aggiungere elementi XML e cambiare i valori.</a:t>
+            </a:r>
+          </a:p>
+          <a:p>
+            <a:pPr lvl="1">
+              <a:buFont typeface="Wingdings" pitchFamily="2" charset="2"/>
+              <a:buChar char="§"/>
+            </a:pPr>
+            <a:r>
+              <a:rPr lang="it-IT" sz="2400" smtClean="0">
+                <a:latin typeface="Times New Roman" pitchFamily="18" charset="0"/>
+                <a:cs typeface="Times New Roman" pitchFamily="18" charset="0"/>
+              </a:rPr>
+              <a:t>Per Android 4.4 (API level 20) e inferiori</a:t>
+            </a:r>
+            <a:r>
+              <a:rPr lang="it-IT" sz="2400" smtClean="0">
+                <a:latin typeface="Times New Roman" pitchFamily="18" charset="0"/>
+                <a:cs typeface="Times New Roman" pitchFamily="18" charset="0"/>
+              </a:rPr>
+              <a:t>, </a:t>
+            </a:r>
+            <a:r>
+              <a:rPr lang="it-IT" sz="2400" smtClean="0">
+                <a:latin typeface="Times New Roman" pitchFamily="18" charset="0"/>
+                <a:cs typeface="Times New Roman" pitchFamily="18" charset="0"/>
+              </a:rPr>
+              <a:t>Vector Asset Studio supporta </a:t>
+            </a:r>
+            <a:r>
+              <a:rPr lang="it-IT" sz="2400" smtClean="0">
+                <a:latin typeface="Times New Roman" pitchFamily="18" charset="0"/>
+                <a:cs typeface="Times New Roman" pitchFamily="18" charset="0"/>
+              </a:rPr>
+              <a:t>tutti gli elementi drawable e un sottoinsieme di elementi VectorDrawable. È possibile cambiare i valori nel codice generato e aggiungere elementi XML che sono supportati.</a:t>
+            </a:r>
+          </a:p>
+          <a:p>
             <a:endParaRPr lang="it-IT"/>
-          </a:p>
-        </p:txBody>
-      </p:sp>
-      <p:sp>
-        <p:nvSpPr>
-          <p:cNvPr id="4" name="Segnaposto data 3"/>
-          <p:cNvSpPr>
-            <a:spLocks noGrp="1"/>
-          </p:cNvSpPr>
-          <p:nvPr>
-            <p:ph type="dt" sz="half" idx="10"/>
-          </p:nvPr>
-        </p:nvSpPr>
-        <p:spPr/>
-        <p:txBody>
-          <a:bodyPr/>
-          <a:lstStyle/>
-          <a:p>
-            <a:pPr rtl="0"/>
-            <a:fld id="{85E0D28E-6F2F-4715-A424-3B01AC64AD4B}" type="datetime1">
-              <a:rPr lang="it-IT" smtClean="0"/>
-              <a:pPr rtl="0"/>
-              <a:t>07/06/2020</a:t>
-            </a:fld>
-            <a:endParaRPr lang="en-US"/>
           </a:p>
         </p:txBody>
       </p:sp>
@@ -11300,7 +10869,7 @@
           <a:p>
             <a:r>
               <a:rPr lang="it-IT" smtClean="0"/>
-              <a:t>Cose da rivedere sulle slide</a:t>
+              <a:t>Modificare codice XML generato</a:t>
             </a:r>
             <a:endParaRPr lang="it-IT"/>
           </a:p>
@@ -11318,36 +10887,394 @@
         </p:nvSpPr>
         <p:spPr/>
         <p:txBody>
+          <a:bodyPr>
+            <a:normAutofit/>
+          </a:bodyPr>
+          <a:lstStyle/>
+          <a:p>
+            <a:r>
+              <a:rPr lang="it-IT" sz="2400" smtClean="0">
+                <a:latin typeface="Times New Roman" pitchFamily="18" charset="0"/>
+                <a:cs typeface="Times New Roman" pitchFamily="18" charset="0"/>
+              </a:rPr>
+              <a:t>Costruire il progetto e controllare che il vector drawable e le immagini raster corrispondenti appaiano allo stesso modo.</a:t>
+            </a:r>
+          </a:p>
+          <a:p>
+            <a:pPr>
+              <a:buNone/>
+            </a:pPr>
+            <a:r>
+              <a:rPr lang="it-IT" sz="2400" smtClean="0">
+                <a:latin typeface="Times New Roman" pitchFamily="18" charset="0"/>
+                <a:cs typeface="Times New Roman" pitchFamily="18" charset="0"/>
+              </a:rPr>
+              <a:t>Ricordare che i file PNG generati potrebbero apparire diversamente da come mostrati nell’anteprima, causa diversi motori di rendering o per qualche cambiamento sul vector drawable prima del Build finale.</a:t>
+            </a:r>
+            <a:endParaRPr lang="it-IT" sz="2400">
+              <a:latin typeface="Times New Roman" pitchFamily="18" charset="0"/>
+              <a:cs typeface="Times New Roman" pitchFamily="18" charset="0"/>
+            </a:endParaRPr>
+          </a:p>
+        </p:txBody>
+      </p:sp>
+    </p:spTree>
+  </p:cSld>
+  <p:clrMapOvr>
+    <a:masterClrMapping/>
+  </p:clrMapOvr>
+</p:sld>
+</file>
+
+<file path=ppt/slides/slide45.xml><?xml version="1.0" encoding="utf-8"?>
+<p:sld xmlns:a="http://schemas.openxmlformats.org/drawingml/2006/main" xmlns:r="http://schemas.openxmlformats.org/officeDocument/2006/relationships" xmlns:p="http://schemas.openxmlformats.org/presentationml/2006/main">
+  <p:cSld>
+    <p:spTree>
+      <p:nvGrpSpPr>
+        <p:cNvPr id="1" name=""/>
+        <p:cNvGrpSpPr/>
+        <p:nvPr/>
+      </p:nvGrpSpPr>
+      <p:grpSpPr>
+        <a:xfrm>
+          <a:off x="0" y="0"/>
+          <a:ext cx="0" cy="0"/>
+          <a:chOff x="0" y="0"/>
+          <a:chExt cx="0" cy="0"/>
+        </a:xfrm>
+      </p:grpSpPr>
+      <p:sp>
+        <p:nvSpPr>
+          <p:cNvPr id="2" name="Titolo 1"/>
+          <p:cNvSpPr>
+            <a:spLocks noGrp="1"/>
+          </p:cNvSpPr>
+          <p:nvPr>
+            <p:ph type="title"/>
+          </p:nvPr>
+        </p:nvSpPr>
+        <p:spPr/>
+        <p:txBody>
           <a:bodyPr/>
           <a:lstStyle/>
           <a:p>
             <a:r>
               <a:rPr lang="it-IT" smtClean="0"/>
-              <a:t>In uno stesso argomento:  scrivere sempre il titolo come in “mostrare vector drawable su widget”, oppure scrivere l’argomento in basso a sinistra piccolino come in “introduzione” (mi piace di più la prima scelta)</a:t>
-            </a:r>
-          </a:p>
+              <a:t>Modificare codice XML generato</a:t>
+            </a:r>
+            <a:endParaRPr lang="it-IT"/>
+          </a:p>
+        </p:txBody>
+      </p:sp>
+      <p:sp>
+        <p:nvSpPr>
+          <p:cNvPr id="3" name="Segnaposto contenuto 2"/>
+          <p:cNvSpPr>
+            <a:spLocks noGrp="1"/>
+          </p:cNvSpPr>
+          <p:nvPr>
+            <p:ph idx="1"/>
+          </p:nvPr>
+        </p:nvSpPr>
+        <p:spPr/>
+        <p:txBody>
+          <a:bodyPr>
+            <a:normAutofit/>
+          </a:bodyPr>
+          <a:lstStyle/>
+          <a:p>
+            <a:r>
+              <a:rPr lang="it-IT" sz="2400" smtClean="0">
+                <a:latin typeface="Times New Roman" pitchFamily="18" charset="0"/>
+                <a:cs typeface="Times New Roman" pitchFamily="18" charset="0"/>
+              </a:rPr>
+              <a:t>Se si aggiunge codice al file XML creato da Vector Asset Studio, qualsiasi aspetto non supportato da Android 4.4 e inferiori non apparirà nel file PNG generato. Di conseguenza, quando si aggiunge codice, bisogna sempre controllare che il PNG generato corrisponda al vector drawable.</a:t>
+            </a:r>
+          </a:p>
+          <a:p>
+            <a:pPr>
+              <a:buNone/>
+            </a:pPr>
+            <a:r>
+              <a:rPr lang="it-IT" sz="2400" smtClean="0">
+                <a:latin typeface="Times New Roman" pitchFamily="18" charset="0"/>
+                <a:cs typeface="Times New Roman" pitchFamily="18" charset="0"/>
+              </a:rPr>
+              <a:t>Per farlo, si può fare doppio click sull’immagine PNG mostrata nel margine sinistro dell’editor di codice, quando il codice si riferisce al drawable.</a:t>
+            </a:r>
+            <a:endParaRPr lang="it-IT" sz="2400">
+              <a:latin typeface="Times New Roman" pitchFamily="18" charset="0"/>
+              <a:cs typeface="Times New Roman" pitchFamily="18" charset="0"/>
+            </a:endParaRPr>
+          </a:p>
+        </p:txBody>
+      </p:sp>
+    </p:spTree>
+  </p:cSld>
+  <p:clrMapOvr>
+    <a:masterClrMapping/>
+  </p:clrMapOvr>
+</p:sld>
+</file>
+
+<file path=ppt/slides/slide46.xml><?xml version="1.0" encoding="utf-8"?>
+<p:sld xmlns:a="http://schemas.openxmlformats.org/drawingml/2006/main" xmlns:r="http://schemas.openxmlformats.org/officeDocument/2006/relationships" xmlns:p="http://schemas.openxmlformats.org/presentationml/2006/main">
+  <p:cSld>
+    <p:spTree>
+      <p:nvGrpSpPr>
+        <p:cNvPr id="1" name=""/>
+        <p:cNvGrpSpPr/>
+        <p:nvPr/>
+      </p:nvGrpSpPr>
+      <p:grpSpPr>
+        <a:xfrm>
+          <a:off x="0" y="0"/>
+          <a:ext cx="0" cy="0"/>
+          <a:chOff x="0" y="0"/>
+          <a:chExt cx="0" cy="0"/>
+        </a:xfrm>
+      </p:grpSpPr>
+      <p:sp>
+        <p:nvSpPr>
+          <p:cNvPr id="2" name="Titolo 1"/>
+          <p:cNvSpPr>
+            <a:spLocks noGrp="1"/>
+          </p:cNvSpPr>
+          <p:nvPr>
+            <p:ph type="title"/>
+          </p:nvPr>
+        </p:nvSpPr>
+        <p:spPr/>
+        <p:txBody>
+          <a:bodyPr/>
+          <a:lstStyle/>
           <a:p>
             <a:r>
               <a:rPr lang="it-IT" smtClean="0"/>
-              <a:t>Caricare parecchi screen per fare più slide, soprattutto dove ci sono dei passaggi da seguire</a:t>
-            </a:r>
-          </a:p>
+              <a:t>Modificare codice XML generato</a:t>
+            </a:r>
+            <a:endParaRPr lang="it-IT"/>
+          </a:p>
+        </p:txBody>
+      </p:sp>
+      <p:sp>
+        <p:nvSpPr>
+          <p:cNvPr id="3" name="Segnaposto contenuto 2"/>
+          <p:cNvSpPr>
+            <a:spLocks noGrp="1"/>
+          </p:cNvSpPr>
+          <p:nvPr>
+            <p:ph idx="1"/>
+          </p:nvPr>
+        </p:nvSpPr>
+        <p:spPr/>
+        <p:txBody>
+          <a:bodyPr>
+            <a:normAutofit/>
+          </a:bodyPr>
+          <a:lstStyle/>
+          <a:p>
+            <a:pPr>
+              <a:buNone/>
+            </a:pPr>
+            <a:r>
+              <a:rPr lang="it-IT" sz="2400" smtClean="0">
+                <a:latin typeface="Times New Roman" pitchFamily="18" charset="0"/>
+                <a:cs typeface="Times New Roman" pitchFamily="18" charset="0"/>
+              </a:rPr>
+              <a:t>In figura si può vedere il codice riferito al vector drawable. Sulla sinistra dell’editor di codice è possibile vedere il file PNG corrispondente:</a:t>
+            </a:r>
+            <a:endParaRPr lang="it-IT" sz="2400">
+              <a:latin typeface="Times New Roman" pitchFamily="18" charset="0"/>
+              <a:cs typeface="Times New Roman" pitchFamily="18" charset="0"/>
+            </a:endParaRPr>
+          </a:p>
+        </p:txBody>
+      </p:sp>
+      <p:pic>
+        <p:nvPicPr>
+          <p:cNvPr id="5" name="Immagine 4" descr="https://developer.android.com/images/tools/vas-imageincode_2-2_2x.png"/>
+          <p:cNvPicPr/>
+          <p:nvPr/>
+        </p:nvPicPr>
+        <p:blipFill>
+          <a:blip r:embed="rId2" cstate="print"/>
+          <a:srcRect/>
+          <a:stretch>
+            <a:fillRect/>
+          </a:stretch>
+        </p:blipFill>
+        <p:spPr bwMode="auto">
+          <a:xfrm>
+            <a:off x="3657600" y="3249387"/>
+            <a:ext cx="4376057" cy="2612570"/>
+          </a:xfrm>
+          <a:prstGeom prst="rect">
+            <a:avLst/>
+          </a:prstGeom>
+          <a:noFill/>
+          <a:ln w="9525">
+            <a:noFill/>
+            <a:miter lim="800000"/>
+            <a:headEnd/>
+            <a:tailEnd/>
+          </a:ln>
+        </p:spPr>
+      </p:pic>
+    </p:spTree>
+  </p:cSld>
+  <p:clrMapOvr>
+    <a:masterClrMapping/>
+  </p:clrMapOvr>
+</p:sld>
+</file>
+
+<file path=ppt/slides/slide47.xml><?xml version="1.0" encoding="utf-8"?>
+<p:sld xmlns:a="http://schemas.openxmlformats.org/drawingml/2006/main" xmlns:r="http://schemas.openxmlformats.org/officeDocument/2006/relationships" xmlns:p="http://schemas.openxmlformats.org/presentationml/2006/main">
+  <p:cSld>
+    <p:spTree>
+      <p:nvGrpSpPr>
+        <p:cNvPr id="1" name=""/>
+        <p:cNvGrpSpPr/>
+        <p:nvPr/>
+      </p:nvGrpSpPr>
+      <p:grpSpPr>
+        <a:xfrm>
+          <a:off x="0" y="0"/>
+          <a:ext cx="0" cy="0"/>
+          <a:chOff x="0" y="0"/>
+          <a:chExt cx="0" cy="0"/>
+        </a:xfrm>
+      </p:grpSpPr>
+      <p:sp>
+        <p:nvSpPr>
+          <p:cNvPr id="2" name="Titolo 1"/>
+          <p:cNvSpPr>
+            <a:spLocks noGrp="1"/>
+          </p:cNvSpPr>
+          <p:nvPr>
+            <p:ph type="title"/>
+          </p:nvPr>
+        </p:nvSpPr>
+        <p:spPr>
+          <a:xfrm>
+            <a:off x="1066800" y="642594"/>
+            <a:ext cx="10314214" cy="1371600"/>
+          </a:xfrm>
+        </p:spPr>
+        <p:txBody>
+          <a:bodyPr/>
+          <a:lstStyle/>
           <a:p>
             <a:r>
               <a:rPr lang="it-IT" smtClean="0"/>
-              <a:t>Rendere consistente il font e lo sfondo slide</a:t>
-            </a:r>
+              <a:t>Rimuovere vector drawable da progetto</a:t>
+            </a:r>
+            <a:endParaRPr lang="it-IT"/>
+          </a:p>
+        </p:txBody>
+      </p:sp>
+      <p:sp>
+        <p:nvSpPr>
+          <p:cNvPr id="3" name="Segnaposto contenuto 2"/>
+          <p:cNvSpPr>
+            <a:spLocks noGrp="1"/>
+          </p:cNvSpPr>
+          <p:nvPr>
+            <p:ph idx="1"/>
+          </p:nvPr>
+        </p:nvSpPr>
+        <p:spPr/>
+        <p:txBody>
+          <a:bodyPr/>
+          <a:lstStyle/>
+          <a:p>
+            <a:pPr>
+              <a:buNone/>
+            </a:pPr>
+            <a:r>
+              <a:rPr lang="it-IT" sz="2400" smtClean="0">
+                <a:latin typeface="Times New Roman" pitchFamily="18" charset="0"/>
+                <a:cs typeface="Times New Roman" pitchFamily="18" charset="0"/>
+              </a:rPr>
+              <a:t>Per rimuovere un vector drawable dal proprio progetto:</a:t>
+            </a:r>
+          </a:p>
+          <a:p>
+            <a:r>
+              <a:rPr lang="it-IT" sz="2400" smtClean="0">
+                <a:latin typeface="Times New Roman" pitchFamily="18" charset="0"/>
+                <a:cs typeface="Times New Roman" pitchFamily="18" charset="0"/>
+              </a:rPr>
+              <a:t>Nella project window, eliminare il file XML generato selezionando il file e premendo il tasto Canc, o selezionare Modifica &gt; Cancella.  Si </a:t>
+            </a:r>
+            <a:r>
+              <a:rPr lang="it-IT" sz="2400" smtClean="0">
+                <a:latin typeface="Times New Roman" pitchFamily="18" charset="0"/>
+                <a:cs typeface="Times New Roman" pitchFamily="18" charset="0"/>
+              </a:rPr>
+              <a:t>aprirà la finestra di eliminazione sicura.</a:t>
+            </a:r>
+          </a:p>
+          <a:p>
+            <a:endParaRPr lang="it-IT" smtClean="0"/>
           </a:p>
           <a:p>
             <a:r>
               <a:rPr lang="it-IT" smtClean="0"/>
-              <a:t>Consiglio di luca bec: a Regoli piacciono le slide a fondo bianco – cambiare queste</a:t>
-            </a:r>
-          </a:p>
+              <a:t>//inserire screen</a:t>
+            </a:r>
+          </a:p>
+        </p:txBody>
+      </p:sp>
+    </p:spTree>
+  </p:cSld>
+  <p:clrMapOvr>
+    <a:masterClrMapping/>
+  </p:clrMapOvr>
+</p:sld>
+</file>
+
+<file path=ppt/slides/slide48.xml><?xml version="1.0" encoding="utf-8"?>
+<p:sld xmlns:a="http://schemas.openxmlformats.org/drawingml/2006/main" xmlns:r="http://schemas.openxmlformats.org/officeDocument/2006/relationships" xmlns:p="http://schemas.openxmlformats.org/presentationml/2006/main">
+  <p:cSld>
+    <p:spTree>
+      <p:nvGrpSpPr>
+        <p:cNvPr id="1" name=""/>
+        <p:cNvGrpSpPr/>
+        <p:nvPr/>
+      </p:nvGrpSpPr>
+      <p:grpSpPr>
+        <a:xfrm>
+          <a:off x="0" y="0"/>
+          <a:ext cx="0" cy="0"/>
+          <a:chOff x="0" y="0"/>
+          <a:chExt cx="0" cy="0"/>
+        </a:xfrm>
+      </p:grpSpPr>
+      <p:sp>
+        <p:nvSpPr>
+          <p:cNvPr id="2" name="Titolo 1"/>
+          <p:cNvSpPr>
+            <a:spLocks noGrp="1"/>
+          </p:cNvSpPr>
+          <p:nvPr>
+            <p:ph type="title"/>
+          </p:nvPr>
+        </p:nvSpPr>
+        <p:spPr>
+          <a:xfrm>
+            <a:off x="1066799" y="642594"/>
+            <a:ext cx="10281557" cy="1371600"/>
+          </a:xfrm>
+        </p:spPr>
+        <p:txBody>
+          <a:bodyPr/>
+          <a:lstStyle/>
           <a:p>
             <a:r>
               <a:rPr lang="it-IT" smtClean="0"/>
-              <a:t>Quando ci sono scritti gli snippet, possibilmente riscriverli su android studio e caricare le immagini invece che le scritte (solo che così non si può fare copia e incolla, come faceva Falessi quel cane)</a:t>
+              <a:t>Rimuovere vector drawable da progetto</a:t>
             </a:r>
             <a:endParaRPr lang="it-IT"/>
           </a:p>
@@ -11355,12 +11282,12 @@
       </p:sp>
       <p:sp>
         <p:nvSpPr>
-          <p:cNvPr id="4" name="Segnaposto data 3"/>
-          <p:cNvSpPr>
-            <a:spLocks noGrp="1"/>
-          </p:cNvSpPr>
-          <p:nvPr>
-            <p:ph type="dt" sz="half" idx="10"/>
+          <p:cNvPr id="3" name="Segnaposto contenuto 2"/>
+          <p:cNvSpPr>
+            <a:spLocks noGrp="1"/>
+          </p:cNvSpPr>
+          <p:nvPr>
+            <p:ph idx="1"/>
           </p:nvPr>
         </p:nvSpPr>
         <p:spPr/>
@@ -11368,13 +11295,137 @@
           <a:bodyPr/>
           <a:lstStyle/>
           <a:p>
-            <a:pPr rtl="0"/>
-            <a:fld id="{85E0D28E-6F2F-4715-A424-3B01AC64AD4B}" type="datetime1">
+            <a:r>
+              <a:rPr lang="it-IT" sz="2400" smtClean="0">
+                <a:latin typeface="Times New Roman" pitchFamily="18" charset="0"/>
+                <a:cs typeface="Times New Roman" pitchFamily="18" charset="0"/>
+              </a:rPr>
+              <a:t>Facoltativamente, selezionare le opzioni per trovare dove viene utilizzato il file nel progetto e fare click su OK. Android Studio elimina il file dal progetto e dal drive.</a:t>
+            </a:r>
+          </a:p>
+          <a:p>
+            <a:pPr>
+              <a:buNone/>
+            </a:pPr>
+            <a:r>
+              <a:rPr lang="it-IT" sz="2400" smtClean="0">
+                <a:latin typeface="Times New Roman" pitchFamily="18" charset="0"/>
+                <a:cs typeface="Times New Roman" pitchFamily="18" charset="0"/>
+              </a:rPr>
+              <a:t>Però, se si è scelto di cercare dove il file è usato nel progetto e vengono trovati utilizzi, è possibile controllarli e decidere se cancellare il file o non farlo.</a:t>
+            </a:r>
+          </a:p>
+          <a:p>
+            <a:pPr>
+              <a:buNone/>
+            </a:pPr>
+            <a:endParaRPr lang="it-IT" smtClean="0"/>
+          </a:p>
+          <a:p>
+            <a:pPr>
+              <a:buNone/>
+            </a:pPr>
+            <a:r>
               <a:rPr lang="it-IT" smtClean="0"/>
-              <a:pPr rtl="0"/>
-              <a:t>07/06/2020</a:t>
-            </a:fld>
-            <a:endParaRPr lang="en-US"/>
+              <a:t>//inserire screen</a:t>
+            </a:r>
+            <a:endParaRPr lang="it-IT"/>
+          </a:p>
+        </p:txBody>
+      </p:sp>
+    </p:spTree>
+  </p:cSld>
+  <p:clrMapOvr>
+    <a:masterClrMapping/>
+  </p:clrMapOvr>
+</p:sld>
+</file>
+
+<file path=ppt/slides/slide49.xml><?xml version="1.0" encoding="utf-8"?>
+<p:sld xmlns:a="http://schemas.openxmlformats.org/drawingml/2006/main" xmlns:r="http://schemas.openxmlformats.org/officeDocument/2006/relationships" xmlns:p="http://schemas.openxmlformats.org/presentationml/2006/main">
+  <p:cSld>
+    <p:spTree>
+      <p:nvGrpSpPr>
+        <p:cNvPr id="1" name=""/>
+        <p:cNvGrpSpPr/>
+        <p:nvPr/>
+      </p:nvGrpSpPr>
+      <p:grpSpPr>
+        <a:xfrm>
+          <a:off x="0" y="0"/>
+          <a:ext cx="0" cy="0"/>
+          <a:chOff x="0" y="0"/>
+          <a:chExt cx="0" cy="0"/>
+        </a:xfrm>
+      </p:grpSpPr>
+      <p:sp>
+        <p:nvSpPr>
+          <p:cNvPr id="2" name="Titolo 1"/>
+          <p:cNvSpPr>
+            <a:spLocks noGrp="1"/>
+          </p:cNvSpPr>
+          <p:nvPr>
+            <p:ph type="title"/>
+          </p:nvPr>
+        </p:nvSpPr>
+        <p:spPr>
+          <a:xfrm>
+            <a:off x="1066799" y="642594"/>
+            <a:ext cx="10346871" cy="1371600"/>
+          </a:xfrm>
+        </p:spPr>
+        <p:txBody>
+          <a:bodyPr/>
+          <a:lstStyle/>
+          <a:p>
+            <a:r>
+              <a:rPr lang="it-IT" smtClean="0"/>
+              <a:t>Rimuovere vector drawable da progetto</a:t>
+            </a:r>
+            <a:endParaRPr lang="it-IT"/>
+          </a:p>
+        </p:txBody>
+      </p:sp>
+      <p:sp>
+        <p:nvSpPr>
+          <p:cNvPr id="3" name="Segnaposto contenuto 2"/>
+          <p:cNvSpPr>
+            <a:spLocks noGrp="1"/>
+          </p:cNvSpPr>
+          <p:nvPr>
+            <p:ph idx="1"/>
+          </p:nvPr>
+        </p:nvSpPr>
+        <p:spPr/>
+        <p:txBody>
+          <a:bodyPr/>
+          <a:lstStyle/>
+          <a:p>
+            <a:r>
+              <a:rPr lang="it-IT" sz="2400" smtClean="0">
+                <a:latin typeface="Times New Roman" pitchFamily="18" charset="0"/>
+                <a:cs typeface="Times New Roman" pitchFamily="18" charset="0"/>
+              </a:rPr>
+              <a:t>Selezionare Build &gt; Clean Project</a:t>
+            </a:r>
+          </a:p>
+          <a:p>
+            <a:pPr>
+              <a:buNone/>
+            </a:pPr>
+            <a:r>
+              <a:rPr lang="it-IT" sz="2400" smtClean="0">
+                <a:latin typeface="Times New Roman" pitchFamily="18" charset="0"/>
+                <a:cs typeface="Times New Roman" pitchFamily="18" charset="0"/>
+              </a:rPr>
+              <a:t>Qualsiasi file PNG e XML autogenerato, corrispondente al vector drawable cancellato, verrà definitivamente rimosso dal progetto e dal drive.</a:t>
+            </a:r>
+          </a:p>
+          <a:p>
+            <a:pPr>
+              <a:buNone/>
+            </a:pPr>
+            <a:endParaRPr lang="it-IT"/>
           </a:p>
         </p:txBody>
       </p:sp>
@@ -11408,7 +11459,7 @@
           <p:cNvPr id="2" name="Titolo 1">
             <a:extLst>
               <a:ext uri="{FF2B5EF4-FFF2-40B4-BE49-F238E27FC236}">
-                <a16:creationId xmlns="" xmlns:a16="http://schemas.microsoft.com/office/drawing/2014/main" id="{833E92F7-52A9-4816-8B4F-FF5856EEA76B}"/>
+                <a16:creationId xmlns:a16="http://schemas.microsoft.com/office/drawing/2014/main" xmlns="" id="{833E92F7-52A9-4816-8B4F-FF5856EEA76B}"/>
               </a:ext>
             </a:extLst>
           </p:cNvPr>
@@ -11440,7 +11491,7 @@
           <p:cNvPr id="3" name="Segnaposto contenuto 2">
             <a:extLst>
               <a:ext uri="{FF2B5EF4-FFF2-40B4-BE49-F238E27FC236}">
-                <a16:creationId xmlns="" xmlns:a16="http://schemas.microsoft.com/office/drawing/2014/main" id="{C07759CF-19AE-4727-AFE3-6FB54EE58A26}"/>
+                <a16:creationId xmlns:a16="http://schemas.microsoft.com/office/drawing/2014/main" xmlns="" id="{C07759CF-19AE-4727-AFE3-6FB54EE58A26}"/>
               </a:ext>
             </a:extLst>
           </p:cNvPr>
@@ -11595,37 +11646,6 @@
           </a:p>
           <a:p>
             <a:endParaRPr lang="it-IT" dirty="0"/>
-          </a:p>
-        </p:txBody>
-      </p:sp>
-      <p:sp>
-        <p:nvSpPr>
-          <p:cNvPr id="4" name="Segnaposto data 3">
-            <a:extLst>
-              <a:ext uri="{FF2B5EF4-FFF2-40B4-BE49-F238E27FC236}">
-                <a16:creationId xmlns="" xmlns:a16="http://schemas.microsoft.com/office/drawing/2014/main" id="{9F73E2D9-1246-4573-B0FE-02611677EC5D}"/>
-              </a:ext>
-            </a:extLst>
-          </p:cNvPr>
-          <p:cNvSpPr>
-            <a:spLocks noGrp="1"/>
-          </p:cNvSpPr>
-          <p:nvPr>
-            <p:ph type="dt" sz="half" idx="10"/>
-          </p:nvPr>
-        </p:nvSpPr>
-        <p:spPr/>
-        <p:txBody>
-          <a:bodyPr/>
-          <a:lstStyle/>
-          <a:p>
-            <a:pPr rtl="0"/>
-            <a:fld id="{85E0D28E-6F2F-4715-A424-3B01AC64AD4B}" type="datetime1">
-              <a:rPr lang="it-IT" smtClean="0"/>
-              <a:pPr rtl="0"/>
-              <a:t>07/06/2020</a:t>
-            </a:fld>
-            <a:endParaRPr lang="en-US"/>
           </a:p>
         </p:txBody>
       </p:sp>
@@ -11668,9 +11688,109 @@
     </p:spTree>
     <p:extLst>
       <p:ext uri="{BB962C8B-B14F-4D97-AF65-F5344CB8AC3E}">
-        <p14:creationId xmlns="" xmlns:p14="http://schemas.microsoft.com/office/powerpoint/2010/main" val="2328969674"/>
+        <p14:creationId xmlns:p14="http://schemas.microsoft.com/office/powerpoint/2010/main" xmlns="" val="2328969674"/>
       </p:ext>
     </p:extLst>
+  </p:cSld>
+  <p:clrMapOvr>
+    <a:masterClrMapping/>
+  </p:clrMapOvr>
+</p:sld>
+</file>
+
+<file path=ppt/slides/slide50.xml><?xml version="1.0" encoding="utf-8"?>
+<p:sld xmlns:a="http://schemas.openxmlformats.org/drawingml/2006/main" xmlns:r="http://schemas.openxmlformats.org/officeDocument/2006/relationships" xmlns:p="http://schemas.openxmlformats.org/presentationml/2006/main">
+  <p:cSld>
+    <p:spTree>
+      <p:nvGrpSpPr>
+        <p:cNvPr id="1" name=""/>
+        <p:cNvGrpSpPr/>
+        <p:nvPr/>
+      </p:nvGrpSpPr>
+      <p:grpSpPr>
+        <a:xfrm>
+          <a:off x="0" y="0"/>
+          <a:ext cx="0" cy="0"/>
+          <a:chOff x="0" y="0"/>
+          <a:chExt cx="0" cy="0"/>
+        </a:xfrm>
+      </p:grpSpPr>
+      <p:sp>
+        <p:nvSpPr>
+          <p:cNvPr id="2" name="Titolo 1"/>
+          <p:cNvSpPr>
+            <a:spLocks noGrp="1"/>
+          </p:cNvSpPr>
+          <p:nvPr>
+            <p:ph type="title"/>
+          </p:nvPr>
+        </p:nvSpPr>
+        <p:spPr/>
+        <p:txBody>
+          <a:bodyPr/>
+          <a:lstStyle/>
+          <a:p>
+            <a:r>
+              <a:rPr lang="it-IT" smtClean="0"/>
+              <a:t>Cose da rivedere sulle slide</a:t>
+            </a:r>
+            <a:endParaRPr lang="it-IT"/>
+          </a:p>
+        </p:txBody>
+      </p:sp>
+      <p:sp>
+        <p:nvSpPr>
+          <p:cNvPr id="3" name="Segnaposto contenuto 2"/>
+          <p:cNvSpPr>
+            <a:spLocks noGrp="1"/>
+          </p:cNvSpPr>
+          <p:nvPr>
+            <p:ph idx="1"/>
+          </p:nvPr>
+        </p:nvSpPr>
+        <p:spPr/>
+        <p:txBody>
+          <a:bodyPr/>
+          <a:lstStyle/>
+          <a:p>
+            <a:r>
+              <a:rPr lang="it-IT" smtClean="0"/>
+              <a:t>In uno stesso argomento:  scrivere sempre il titolo come in “mostrare vector drawable su widget”, oppure scrivere l’argomento in basso a sinistra piccolino come in “introduzione” </a:t>
+            </a:r>
+            <a:r>
+              <a:rPr lang="it-IT" smtClean="0"/>
+              <a:t>(meglio la prima)</a:t>
+            </a:r>
+            <a:endParaRPr lang="it-IT" smtClean="0"/>
+          </a:p>
+          <a:p>
+            <a:r>
+              <a:rPr lang="it-IT" smtClean="0"/>
+              <a:t>Caricare parecchi screen per fare più slide, soprattutto dove ci sono dei passaggi da seguire</a:t>
+            </a:r>
+          </a:p>
+          <a:p>
+            <a:r>
+              <a:rPr lang="it-IT" smtClean="0"/>
+              <a:t>Rendere consistente il font e lo sfondo slide</a:t>
+            </a:r>
+          </a:p>
+          <a:p>
+            <a:r>
+              <a:rPr lang="it-IT" smtClean="0"/>
+              <a:t>Consiglio di luca bec: a Regoli piacciono le slide a fondo bianco – cambiare queste</a:t>
+            </a:r>
+          </a:p>
+          <a:p>
+            <a:r>
+              <a:rPr lang="it-IT" smtClean="0"/>
+              <a:t>Quando ci sono scritti gli snippet, possibilmente riscriverli su android studio e caricare le immagini invece che le scritte (solo che così non si può fare copia e incolla, come faceva Falessi quel cane)</a:t>
+            </a:r>
+            <a:endParaRPr lang="it-IT"/>
+          </a:p>
+        </p:txBody>
+      </p:sp>
+    </p:spTree>
   </p:cSld>
   <p:clrMapOvr>
     <a:masterClrMapping/>
@@ -11700,7 +11820,7 @@
           <p:cNvPr id="2" name="Titolo 1">
             <a:extLst>
               <a:ext uri="{FF2B5EF4-FFF2-40B4-BE49-F238E27FC236}">
-                <a16:creationId xmlns="" xmlns:a16="http://schemas.microsoft.com/office/drawing/2014/main" id="{08E9130B-3DA2-4409-B4FB-4ED5F7053F10}"/>
+                <a16:creationId xmlns:a16="http://schemas.microsoft.com/office/drawing/2014/main" xmlns="" id="{08E9130B-3DA2-4409-B4FB-4ED5F7053F10}"/>
               </a:ext>
             </a:extLst>
           </p:cNvPr>
@@ -11744,7 +11864,7 @@
           <p:cNvPr id="3" name="Segnaposto contenuto 2">
             <a:extLst>
               <a:ext uri="{FF2B5EF4-FFF2-40B4-BE49-F238E27FC236}">
-                <a16:creationId xmlns="" xmlns:a16="http://schemas.microsoft.com/office/drawing/2014/main" id="{72B4423A-4DCE-4192-89A0-E056AA2241FF}"/>
+                <a16:creationId xmlns:a16="http://schemas.microsoft.com/office/drawing/2014/main" xmlns="" id="{72B4423A-4DCE-4192-89A0-E056AA2241FF}"/>
               </a:ext>
             </a:extLst>
           </p:cNvPr>
@@ -11959,37 +12079,6 @@
               <a:latin typeface="Times New Roman" panose="02020603050405020304" pitchFamily="18" charset="0"/>
               <a:cs typeface="Times New Roman" panose="02020603050405020304" pitchFamily="18" charset="0"/>
             </a:endParaRPr>
-          </a:p>
-        </p:txBody>
-      </p:sp>
-      <p:sp>
-        <p:nvSpPr>
-          <p:cNvPr id="4" name="Segnaposto data 3">
-            <a:extLst>
-              <a:ext uri="{FF2B5EF4-FFF2-40B4-BE49-F238E27FC236}">
-                <a16:creationId xmlns="" xmlns:a16="http://schemas.microsoft.com/office/drawing/2014/main" id="{385DA464-32FA-4976-83FD-03C573CDCF7E}"/>
-              </a:ext>
-            </a:extLst>
-          </p:cNvPr>
-          <p:cNvSpPr>
-            <a:spLocks noGrp="1"/>
-          </p:cNvSpPr>
-          <p:nvPr>
-            <p:ph type="dt" sz="half" idx="10"/>
-          </p:nvPr>
-        </p:nvSpPr>
-        <p:spPr/>
-        <p:txBody>
-          <a:bodyPr/>
-          <a:lstStyle/>
-          <a:p>
-            <a:pPr rtl="0"/>
-            <a:fld id="{85E0D28E-6F2F-4715-A424-3B01AC64AD4B}" type="datetime1">
-              <a:rPr lang="it-IT" smtClean="0"/>
-              <a:pPr rtl="0"/>
-              <a:t>07/06/2020</a:t>
-            </a:fld>
-            <a:endParaRPr lang="en-US"/>
           </a:p>
         </p:txBody>
       </p:sp>
@@ -12032,7 +12121,7 @@
     </p:spTree>
     <p:extLst>
       <p:ext uri="{BB962C8B-B14F-4D97-AF65-F5344CB8AC3E}">
-        <p14:creationId xmlns="" xmlns:p14="http://schemas.microsoft.com/office/powerpoint/2010/main" val="520281786"/>
+        <p14:creationId xmlns:p14="http://schemas.microsoft.com/office/powerpoint/2010/main" xmlns="" val="520281786"/>
       </p:ext>
     </p:extLst>
   </p:cSld>
@@ -12127,31 +12216,6 @@
       </p:sp>
       <p:sp>
         <p:nvSpPr>
-          <p:cNvPr id="4" name="Segnaposto data 3"/>
-          <p:cNvSpPr>
-            <a:spLocks noGrp="1"/>
-          </p:cNvSpPr>
-          <p:nvPr>
-            <p:ph type="dt" sz="half" idx="10"/>
-          </p:nvPr>
-        </p:nvSpPr>
-        <p:spPr/>
-        <p:txBody>
-          <a:bodyPr/>
-          <a:lstStyle/>
-          <a:p>
-            <a:pPr rtl="0"/>
-            <a:fld id="{85E0D28E-6F2F-4715-A424-3B01AC64AD4B}" type="datetime1">
-              <a:rPr lang="it-IT" smtClean="0"/>
-              <a:pPr rtl="0"/>
-              <a:t>07/06/2020</a:t>
-            </a:fld>
-            <a:endParaRPr lang="en-US"/>
-          </a:p>
-        </p:txBody>
-      </p:sp>
-      <p:sp>
-        <p:nvSpPr>
           <p:cNvPr id="5" name="CasellaDiTesto 4"/>
           <p:cNvSpPr txBox="1"/>
           <p:nvPr/>
@@ -12216,7 +12280,7 @@
           <p:cNvPr id="2" name="Titolo 1">
             <a:extLst>
               <a:ext uri="{FF2B5EF4-FFF2-40B4-BE49-F238E27FC236}">
-                <a16:creationId xmlns="" xmlns:a16="http://schemas.microsoft.com/office/drawing/2014/main" id="{353D50A2-DC09-42B6-89B9-3753B89C9AC8}"/>
+                <a16:creationId xmlns:a16="http://schemas.microsoft.com/office/drawing/2014/main" xmlns="" id="{353D50A2-DC09-42B6-89B9-3753B89C9AC8}"/>
               </a:ext>
             </a:extLst>
           </p:cNvPr>
@@ -12258,7 +12322,7 @@
           <p:cNvPr id="3" name="Segnaposto contenuto 2">
             <a:extLst>
               <a:ext uri="{FF2B5EF4-FFF2-40B4-BE49-F238E27FC236}">
-                <a16:creationId xmlns="" xmlns:a16="http://schemas.microsoft.com/office/drawing/2014/main" id="{F7BF9498-2030-41D6-B346-7142A4149882}"/>
+                <a16:creationId xmlns:a16="http://schemas.microsoft.com/office/drawing/2014/main" xmlns="" id="{F7BF9498-2030-41D6-B346-7142A4149882}"/>
               </a:ext>
             </a:extLst>
           </p:cNvPr>
@@ -12307,7 +12371,7 @@
     </p:spTree>
     <p:extLst>
       <p:ext uri="{BB962C8B-B14F-4D97-AF65-F5344CB8AC3E}">
-        <p14:creationId xmlns="" xmlns:p14="http://schemas.microsoft.com/office/powerpoint/2010/main" val="237379470"/>
+        <p14:creationId xmlns:p14="http://schemas.microsoft.com/office/powerpoint/2010/main" xmlns="" val="237379470"/>
       </p:ext>
     </p:extLst>
   </p:cSld>
@@ -12339,7 +12403,7 @@
           <p:cNvPr id="2" name="Titolo 1">
             <a:extLst>
               <a:ext uri="{FF2B5EF4-FFF2-40B4-BE49-F238E27FC236}">
-                <a16:creationId xmlns="" xmlns:a16="http://schemas.microsoft.com/office/drawing/2014/main" id="{E220F6AF-1752-43FE-8D9A-A6757A9BC433}"/>
+                <a16:creationId xmlns:a16="http://schemas.microsoft.com/office/drawing/2014/main" xmlns="" id="{E220F6AF-1752-43FE-8D9A-A6757A9BC433}"/>
               </a:ext>
             </a:extLst>
           </p:cNvPr>
@@ -12369,7 +12433,7 @@
           <p:cNvPr id="3" name="Segnaposto contenuto 2">
             <a:extLst>
               <a:ext uri="{FF2B5EF4-FFF2-40B4-BE49-F238E27FC236}">
-                <a16:creationId xmlns="" xmlns:a16="http://schemas.microsoft.com/office/drawing/2014/main" id="{5B6073A4-E04E-4386-BCB8-4F4D1730C4CE}"/>
+                <a16:creationId xmlns:a16="http://schemas.microsoft.com/office/drawing/2014/main" xmlns="" id="{5B6073A4-E04E-4386-BCB8-4F4D1730C4CE}"/>
               </a:ext>
             </a:extLst>
           </p:cNvPr>
@@ -12418,7 +12482,7 @@
     </p:spTree>
     <p:extLst>
       <p:ext uri="{BB962C8B-B14F-4D97-AF65-F5344CB8AC3E}">
-        <p14:creationId xmlns="" xmlns:p14="http://schemas.microsoft.com/office/powerpoint/2010/main" val="28250"/>
+        <p14:creationId xmlns:p14="http://schemas.microsoft.com/office/powerpoint/2010/main" xmlns="" val="28250"/>
       </p:ext>
     </p:extLst>
   </p:cSld>
@@ -12698,7 +12762,7 @@
   <a:extraClrSchemeLst/>
   <a:extLst>
     <a:ext uri="{05A4C25C-085E-4340-85A3-A5531E510DB2}">
-      <thm15:themeFamily xmlns="" xmlns:thm15="http://schemas.microsoft.com/office/thememl/2012/main" name="Office_41798854_TF78438558" id="{03469F01-97D1-4A1E-853B-6A26B56D87BB}" vid="{335298E4-38AB-4269-9352-375A27B59611}"/>
+      <thm15:themeFamily xmlns:thm15="http://schemas.microsoft.com/office/thememl/2012/main" xmlns="" name="Office_41798854_TF78438558" id="{03469F01-97D1-4A1E-853B-6A26B56D87BB}" vid="{335298E4-38AB-4269-9352-375A27B59611}"/>
     </a:ext>
   </a:extLst>
 </a:theme>
@@ -12959,7 +13023,7 @@
   <a:extraClrSchemeLst/>
   <a:extLst>
     <a:ext uri="{05A4C25C-085E-4340-85A3-A5531E510DB2}">
-      <thm15:themeFamily xmlns="" xmlns:thm15="http://schemas.microsoft.com/office/thememl/2012/main" name="Office Theme" id="{62F939B6-93AF-4DB8-9C6B-D6C7DFDC589F}" vid="{4A3C46E8-61CC-4603-A589-7422A47A8E4A}"/>
+      <thm15:themeFamily xmlns:thm15="http://schemas.microsoft.com/office/thememl/2012/main" xmlns="" name="Office Theme" id="{62F939B6-93AF-4DB8-9C6B-D6C7DFDC589F}" vid="{4A3C46E8-61CC-4603-A589-7422A47A8E4A}"/>
     </a:ext>
   </a:extLst>
 </a:theme>
@@ -13220,7 +13284,7 @@
   <a:extraClrSchemeLst/>
   <a:extLst>
     <a:ext uri="{05A4C25C-085E-4340-85A3-A5531E510DB2}">
-      <thm15:themeFamily xmlns="" xmlns:thm15="http://schemas.microsoft.com/office/thememl/2012/main" name="Office Theme" id="{62F939B6-93AF-4DB8-9C6B-D6C7DFDC589F}" vid="{4A3C46E8-61CC-4603-A589-7422A47A8E4A}"/>
+      <thm15:themeFamily xmlns:thm15="http://schemas.microsoft.com/office/thememl/2012/main" xmlns="" name="Office Theme" id="{62F939B6-93AF-4DB8-9C6B-D6C7DFDC589F}" vid="{4A3C46E8-61CC-4603-A589-7422A47A8E4A}"/>
     </a:ext>
   </a:extLst>
 </a:theme>

</xml_diff>